<commit_message>
Continuing Issue 404 [Convert 'Coordinator' to 'Instructor'] Stage 3: tweaked to keep Coordinator entity inside Db layer while ther rest of the app users Instructor. Updated DevMan and Spec to reflect changes. Increased max CourseId size 21->30 because some of the course IDs used for testing exceeded 21 char after replacing coord with instructor. Update Issue 404
</commit_message>
<xml_diff>
--- a/doc/diagrams/Actors.pptx
+++ b/doc/diagrams/Actors.pptx
@@ -193,7 +193,7 @@
             <a:fld id="{DC50A2AC-D691-437C-A69B-81ECFE08AD4B}" type="datetimeFigureOut">
               <a:rPr lang="en-SG" smtClean="0"/>
               <a:pPr/>
-              <a:t>28/8/2012</a:t>
+              <a:t>1/12/2012</a:t>
             </a:fld>
             <a:endParaRPr lang="en-SG"/>
           </a:p>
@@ -362,7 +362,7 @@
     </p:spTree>
     <p:extLst>
       <p:ext uri="{BB962C8B-B14F-4D97-AF65-F5344CB8AC3E}">
-        <p14:creationId xmlns="" xmlns:p14="http://schemas.microsoft.com/office/powerpoint/2010/main" val="2265103329"/>
+        <p14:creationId xmlns:p14="http://schemas.microsoft.com/office/powerpoint/2010/main" val="2265103329"/>
       </p:ext>
     </p:extLst>
   </p:cSld>
@@ -542,7 +542,7 @@
     </p:spTree>
     <p:extLst>
       <p:ext uri="{BB962C8B-B14F-4D97-AF65-F5344CB8AC3E}">
-        <p14:creationId xmlns="" xmlns:p14="http://schemas.microsoft.com/office/powerpoint/2010/main" val="1558229004"/>
+        <p14:creationId xmlns:p14="http://schemas.microsoft.com/office/powerpoint/2010/main" val="1558229004"/>
       </p:ext>
     </p:extLst>
   </p:cSld>
@@ -734,7 +734,7 @@
             <a:fld id="{1D8BD707-D9CF-40AE-B4C6-C98DA3205C09}" type="datetimeFigureOut">
               <a:rPr lang="en-US" smtClean="0"/>
               <a:pPr/>
-              <a:t>8/28/2012</a:t>
+              <a:t>12/1/2012</a:t>
             </a:fld>
             <a:endParaRPr lang="en-US"/>
           </a:p>
@@ -901,7 +901,7 @@
             <a:fld id="{1D8BD707-D9CF-40AE-B4C6-C98DA3205C09}" type="datetimeFigureOut">
               <a:rPr lang="en-US" smtClean="0"/>
               <a:pPr/>
-              <a:t>8/28/2012</a:t>
+              <a:t>12/1/2012</a:t>
             </a:fld>
             <a:endParaRPr lang="en-US"/>
           </a:p>
@@ -1078,7 +1078,7 @@
             <a:fld id="{1D8BD707-D9CF-40AE-B4C6-C98DA3205C09}" type="datetimeFigureOut">
               <a:rPr lang="en-US" smtClean="0"/>
               <a:pPr/>
-              <a:t>8/28/2012</a:t>
+              <a:t>12/1/2012</a:t>
             </a:fld>
             <a:endParaRPr lang="en-US"/>
           </a:p>
@@ -1245,7 +1245,7 @@
             <a:fld id="{1D8BD707-D9CF-40AE-B4C6-C98DA3205C09}" type="datetimeFigureOut">
               <a:rPr lang="en-US" smtClean="0"/>
               <a:pPr/>
-              <a:t>8/28/2012</a:t>
+              <a:t>12/1/2012</a:t>
             </a:fld>
             <a:endParaRPr lang="en-US"/>
           </a:p>
@@ -1488,7 +1488,7 @@
             <a:fld id="{1D8BD707-D9CF-40AE-B4C6-C98DA3205C09}" type="datetimeFigureOut">
               <a:rPr lang="en-US" smtClean="0"/>
               <a:pPr/>
-              <a:t>8/28/2012</a:t>
+              <a:t>12/1/2012</a:t>
             </a:fld>
             <a:endParaRPr lang="en-US"/>
           </a:p>
@@ -1773,7 +1773,7 @@
             <a:fld id="{1D8BD707-D9CF-40AE-B4C6-C98DA3205C09}" type="datetimeFigureOut">
               <a:rPr lang="en-US" smtClean="0"/>
               <a:pPr/>
-              <a:t>8/28/2012</a:t>
+              <a:t>12/1/2012</a:t>
             </a:fld>
             <a:endParaRPr lang="en-US"/>
           </a:p>
@@ -2192,7 +2192,7 @@
             <a:fld id="{1D8BD707-D9CF-40AE-B4C6-C98DA3205C09}" type="datetimeFigureOut">
               <a:rPr lang="en-US" smtClean="0"/>
               <a:pPr/>
-              <a:t>8/28/2012</a:t>
+              <a:t>12/1/2012</a:t>
             </a:fld>
             <a:endParaRPr lang="en-US"/>
           </a:p>
@@ -2307,7 +2307,7 @@
             <a:fld id="{1D8BD707-D9CF-40AE-B4C6-C98DA3205C09}" type="datetimeFigureOut">
               <a:rPr lang="en-US" smtClean="0"/>
               <a:pPr/>
-              <a:t>8/28/2012</a:t>
+              <a:t>12/1/2012</a:t>
             </a:fld>
             <a:endParaRPr lang="en-US"/>
           </a:p>
@@ -2399,7 +2399,7 @@
             <a:fld id="{1D8BD707-D9CF-40AE-B4C6-C98DA3205C09}" type="datetimeFigureOut">
               <a:rPr lang="en-US" smtClean="0"/>
               <a:pPr/>
-              <a:t>8/28/2012</a:t>
+              <a:t>12/1/2012</a:t>
             </a:fld>
             <a:endParaRPr lang="en-US"/>
           </a:p>
@@ -2673,7 +2673,7 @@
             <a:fld id="{1D8BD707-D9CF-40AE-B4C6-C98DA3205C09}" type="datetimeFigureOut">
               <a:rPr lang="en-US" smtClean="0"/>
               <a:pPr/>
-              <a:t>8/28/2012</a:t>
+              <a:t>12/1/2012</a:t>
             </a:fld>
             <a:endParaRPr lang="en-US"/>
           </a:p>
@@ -2923,7 +2923,7 @@
             <a:fld id="{1D8BD707-D9CF-40AE-B4C6-C98DA3205C09}" type="datetimeFigureOut">
               <a:rPr lang="en-US" smtClean="0"/>
               <a:pPr/>
-              <a:t>8/28/2012</a:t>
+              <a:t>12/1/2012</a:t>
             </a:fld>
             <a:endParaRPr lang="en-US"/>
           </a:p>
@@ -3133,7 +3133,7 @@
             <a:fld id="{1D8BD707-D9CF-40AE-B4C6-C98DA3205C09}" type="datetimeFigureOut">
               <a:rPr lang="en-US" smtClean="0"/>
               <a:pPr/>
-              <a:t>8/28/2012</a:t>
+              <a:t>12/1/2012</a:t>
             </a:fld>
             <a:endParaRPr lang="en-US"/>
           </a:p>
@@ -3532,6 +3532,11 @@
             <a:prstGeom prst="flowChartConnector">
               <a:avLst/>
             </a:prstGeom>
+            <a:ln>
+              <a:solidFill>
+                <a:schemeClr val="accent6"/>
+              </a:solidFill>
+            </a:ln>
           </p:spPr>
           <p:style>
             <a:lnRef idx="2">
@@ -3572,6 +3577,11 @@
             <a:prstGeom prst="line">
               <a:avLst/>
             </a:prstGeom>
+            <a:ln>
+              <a:solidFill>
+                <a:schemeClr val="accent6"/>
+              </a:solidFill>
+            </a:ln>
           </p:spPr>
           <p:style>
             <a:lnRef idx="2">
@@ -3602,6 +3612,11 @@
             <a:prstGeom prst="line">
               <a:avLst/>
             </a:prstGeom>
+            <a:ln>
+              <a:solidFill>
+                <a:schemeClr val="accent6"/>
+              </a:solidFill>
+            </a:ln>
           </p:spPr>
           <p:style>
             <a:lnRef idx="2">
@@ -3632,6 +3647,11 @@
             <a:prstGeom prst="line">
               <a:avLst/>
             </a:prstGeom>
+            <a:ln>
+              <a:solidFill>
+                <a:schemeClr val="accent6"/>
+              </a:solidFill>
+            </a:ln>
           </p:spPr>
           <p:style>
             <a:lnRef idx="2">
@@ -3662,6 +3682,11 @@
             <a:prstGeom prst="line">
               <a:avLst/>
             </a:prstGeom>
+            <a:ln>
+              <a:solidFill>
+                <a:schemeClr val="accent6"/>
+              </a:solidFill>
+            </a:ln>
           </p:spPr>
           <p:style>
             <a:lnRef idx="2">
@@ -3919,14 +3944,14 @@
             <a:r>
               <a:rPr lang="en-US" b="1" dirty="0" smtClean="0">
                 <a:solidFill>
-                  <a:srgbClr val="0070C0"/>
+                  <a:schemeClr val="accent6"/>
                 </a:solidFill>
               </a:rPr>
               <a:t>Student</a:t>
             </a:r>
             <a:endParaRPr lang="en-US" b="1" dirty="0">
               <a:solidFill>
-                <a:srgbClr val="0070C0"/>
+                <a:schemeClr val="accent6"/>
               </a:solidFill>
             </a:endParaRPr>
           </a:p>
@@ -3974,221 +3999,6 @@
           </a:p>
         </p:txBody>
       </p:sp>
-      <p:grpSp>
-        <p:nvGrpSpPr>
-          <p:cNvPr id="234" name="Group 233"/>
-          <p:cNvGrpSpPr/>
-          <p:nvPr/>
-        </p:nvGrpSpPr>
-        <p:grpSpPr>
-          <a:xfrm>
-            <a:off x="2720181" y="442119"/>
-            <a:ext cx="533400" cy="1066800"/>
-            <a:chOff x="1424781" y="1127919"/>
-            <a:chExt cx="609600" cy="1295400"/>
-          </a:xfrm>
-        </p:grpSpPr>
-        <p:sp>
-          <p:nvSpPr>
-            <p:cNvPr id="235" name="Flowchart: Connector 234"/>
-            <p:cNvSpPr/>
-            <p:nvPr/>
-          </p:nvSpPr>
-          <p:spPr>
-            <a:xfrm>
-              <a:off x="1500981" y="1127919"/>
-              <a:ext cx="457200" cy="457200"/>
-            </a:xfrm>
-            <a:prstGeom prst="flowChartConnector">
-              <a:avLst/>
-            </a:prstGeom>
-            <a:ln>
-              <a:solidFill>
-                <a:schemeClr val="bg1">
-                  <a:lumMod val="50000"/>
-                </a:schemeClr>
-              </a:solidFill>
-              <a:prstDash val="sysDot"/>
-            </a:ln>
-          </p:spPr>
-          <p:style>
-            <a:lnRef idx="2">
-              <a:schemeClr val="accent1"/>
-            </a:lnRef>
-            <a:fillRef idx="1">
-              <a:schemeClr val="lt1"/>
-            </a:fillRef>
-            <a:effectRef idx="0">
-              <a:schemeClr val="accent1"/>
-            </a:effectRef>
-            <a:fontRef idx="minor">
-              <a:schemeClr val="dk1"/>
-            </a:fontRef>
-          </p:style>
-          <p:txBody>
-            <a:bodyPr rtlCol="0" anchor="ctr"/>
-            <a:lstStyle/>
-            <a:p>
-              <a:pPr algn="ctr"/>
-              <a:endParaRPr lang="en-US"/>
-            </a:p>
-          </p:txBody>
-        </p:sp>
-        <p:cxnSp>
-          <p:nvCxnSpPr>
-            <p:cNvPr id="236" name="Straight Connector 235"/>
-            <p:cNvCxnSpPr>
-              <a:stCxn id="235" idx="4"/>
-            </p:cNvCxnSpPr>
-            <p:nvPr/>
-          </p:nvCxnSpPr>
-          <p:spPr>
-            <a:xfrm>
-              <a:off x="1729581" y="1585119"/>
-              <a:ext cx="0" cy="457200"/>
-            </a:xfrm>
-            <a:prstGeom prst="line">
-              <a:avLst/>
-            </a:prstGeom>
-            <a:ln>
-              <a:solidFill>
-                <a:schemeClr val="bg1">
-                  <a:lumMod val="50000"/>
-                </a:schemeClr>
-              </a:solidFill>
-              <a:prstDash val="sysDot"/>
-            </a:ln>
-          </p:spPr>
-          <p:style>
-            <a:lnRef idx="2">
-              <a:schemeClr val="accent1"/>
-            </a:lnRef>
-            <a:fillRef idx="1">
-              <a:schemeClr val="lt1"/>
-            </a:fillRef>
-            <a:effectRef idx="0">
-              <a:schemeClr val="accent1"/>
-            </a:effectRef>
-            <a:fontRef idx="minor">
-              <a:schemeClr val="dk1"/>
-            </a:fontRef>
-          </p:style>
-        </p:cxnSp>
-        <p:cxnSp>
-          <p:nvCxnSpPr>
-            <p:cNvPr id="237" name="Straight Connector 236"/>
-            <p:cNvCxnSpPr/>
-            <p:nvPr/>
-          </p:nvCxnSpPr>
-          <p:spPr>
-            <a:xfrm flipH="1">
-              <a:off x="1500981" y="2042319"/>
-              <a:ext cx="228600" cy="381000"/>
-            </a:xfrm>
-            <a:prstGeom prst="line">
-              <a:avLst/>
-            </a:prstGeom>
-            <a:ln>
-              <a:solidFill>
-                <a:schemeClr val="bg1">
-                  <a:lumMod val="50000"/>
-                </a:schemeClr>
-              </a:solidFill>
-              <a:prstDash val="sysDot"/>
-            </a:ln>
-          </p:spPr>
-          <p:style>
-            <a:lnRef idx="2">
-              <a:schemeClr val="accent1"/>
-            </a:lnRef>
-            <a:fillRef idx="1">
-              <a:schemeClr val="lt1"/>
-            </a:fillRef>
-            <a:effectRef idx="0">
-              <a:schemeClr val="accent1"/>
-            </a:effectRef>
-            <a:fontRef idx="minor">
-              <a:schemeClr val="dk1"/>
-            </a:fontRef>
-          </p:style>
-        </p:cxnSp>
-        <p:cxnSp>
-          <p:nvCxnSpPr>
-            <p:cNvPr id="238" name="Straight Connector 237"/>
-            <p:cNvCxnSpPr/>
-            <p:nvPr/>
-          </p:nvCxnSpPr>
-          <p:spPr>
-            <a:xfrm>
-              <a:off x="1729581" y="2042319"/>
-              <a:ext cx="228600" cy="381000"/>
-            </a:xfrm>
-            <a:prstGeom prst="line">
-              <a:avLst/>
-            </a:prstGeom>
-            <a:ln>
-              <a:solidFill>
-                <a:schemeClr val="bg1">
-                  <a:lumMod val="50000"/>
-                </a:schemeClr>
-              </a:solidFill>
-              <a:prstDash val="sysDot"/>
-            </a:ln>
-          </p:spPr>
-          <p:style>
-            <a:lnRef idx="2">
-              <a:schemeClr val="accent1"/>
-            </a:lnRef>
-            <a:fillRef idx="1">
-              <a:schemeClr val="lt1"/>
-            </a:fillRef>
-            <a:effectRef idx="0">
-              <a:schemeClr val="accent1"/>
-            </a:effectRef>
-            <a:fontRef idx="minor">
-              <a:schemeClr val="dk1"/>
-            </a:fontRef>
-          </p:style>
-        </p:cxnSp>
-        <p:cxnSp>
-          <p:nvCxnSpPr>
-            <p:cNvPr id="239" name="Straight Connector 238"/>
-            <p:cNvCxnSpPr/>
-            <p:nvPr/>
-          </p:nvCxnSpPr>
-          <p:spPr>
-            <a:xfrm>
-              <a:off x="1424781" y="1737519"/>
-              <a:ext cx="609600" cy="0"/>
-            </a:xfrm>
-            <a:prstGeom prst="line">
-              <a:avLst/>
-            </a:prstGeom>
-            <a:ln>
-              <a:solidFill>
-                <a:schemeClr val="bg1">
-                  <a:lumMod val="50000"/>
-                </a:schemeClr>
-              </a:solidFill>
-              <a:prstDash val="sysDot"/>
-            </a:ln>
-          </p:spPr>
-          <p:style>
-            <a:lnRef idx="2">
-              <a:schemeClr val="accent1"/>
-            </a:lnRef>
-            <a:fillRef idx="1">
-              <a:schemeClr val="lt1"/>
-            </a:fillRef>
-            <a:effectRef idx="0">
-              <a:schemeClr val="accent1"/>
-            </a:effectRef>
-            <a:fontRef idx="minor">
-              <a:schemeClr val="dk1"/>
-            </a:fontRef>
-          </p:style>
-        </p:cxnSp>
-      </p:grpSp>
       <p:sp>
         <p:nvSpPr>
           <p:cNvPr id="240" name="TextBox 239"/>
@@ -4197,7 +4007,7 @@
         </p:nvSpPr>
         <p:spPr>
           <a:xfrm>
-            <a:off x="2567781" y="1585119"/>
+            <a:off x="2438400" y="1585119"/>
             <a:ext cx="1143000" cy="353943"/>
           </a:xfrm>
           <a:prstGeom prst="rect">
@@ -4214,18 +4024,14 @@
             <a:r>
               <a:rPr lang="en-US" b="1" dirty="0" smtClean="0">
                 <a:solidFill>
-                  <a:schemeClr val="bg1">
-                    <a:lumMod val="50000"/>
-                  </a:schemeClr>
+                  <a:srgbClr val="0070C0"/>
                 </a:solidFill>
               </a:rPr>
               <a:t>Instructor</a:t>
             </a:r>
             <a:endParaRPr lang="en-US" b="1" dirty="0">
               <a:solidFill>
-                <a:schemeClr val="bg1">
-                  <a:lumMod val="50000"/>
-                </a:schemeClr>
+                <a:srgbClr val="0070C0"/>
               </a:solidFill>
             </a:endParaRPr>
           </a:p>
@@ -4239,7 +4045,7 @@
         </p:nvGrpSpPr>
         <p:grpSpPr>
           <a:xfrm>
-            <a:off x="2720181" y="2956719"/>
+            <a:off x="2720181" y="2804319"/>
             <a:ext cx="533400" cy="1066800"/>
             <a:chOff x="1424781" y="1127919"/>
             <a:chExt cx="609600" cy="1295400"/>
@@ -4259,6 +4065,11 @@
             <a:prstGeom prst="flowChartConnector">
               <a:avLst/>
             </a:prstGeom>
+            <a:ln>
+              <a:solidFill>
+                <a:srgbClr val="0070C0"/>
+              </a:solidFill>
+            </a:ln>
           </p:spPr>
           <p:style>
             <a:lnRef idx="2">
@@ -4299,6 +4110,11 @@
             <a:prstGeom prst="line">
               <a:avLst/>
             </a:prstGeom>
+            <a:ln>
+              <a:solidFill>
+                <a:srgbClr val="0070C0"/>
+              </a:solidFill>
+            </a:ln>
           </p:spPr>
           <p:style>
             <a:lnRef idx="2">
@@ -4329,6 +4145,11 @@
             <a:prstGeom prst="line">
               <a:avLst/>
             </a:prstGeom>
+            <a:ln>
+              <a:solidFill>
+                <a:srgbClr val="0070C0"/>
+              </a:solidFill>
+            </a:ln>
           </p:spPr>
           <p:style>
             <a:lnRef idx="2">
@@ -4359,6 +4180,11 @@
             <a:prstGeom prst="line">
               <a:avLst/>
             </a:prstGeom>
+            <a:ln>
+              <a:solidFill>
+                <a:srgbClr val="0070C0"/>
+              </a:solidFill>
+            </a:ln>
           </p:spPr>
           <p:style>
             <a:lnRef idx="2">
@@ -4389,6 +4215,11 @@
             <a:prstGeom prst="line">
               <a:avLst/>
             </a:prstGeom>
+            <a:ln>
+              <a:solidFill>
+                <a:srgbClr val="0070C0"/>
+              </a:solidFill>
+            </a:ln>
           </p:spPr>
           <p:style>
             <a:lnRef idx="2">
@@ -4414,8 +4245,8 @@
         </p:nvSpPr>
         <p:spPr>
           <a:xfrm>
-            <a:off x="2415381" y="4023519"/>
-            <a:ext cx="1295400" cy="353943"/>
+            <a:off x="2057400" y="3794919"/>
+            <a:ext cx="1699419" cy="615553"/>
           </a:xfrm>
           <a:prstGeom prst="rect">
             <a:avLst/>
@@ -4428,13 +4259,14 @@
           </a:bodyPr>
           <a:lstStyle/>
           <a:p>
+            <a:pPr algn="ctr"/>
             <a:r>
               <a:rPr lang="en-US" b="1" dirty="0" smtClean="0">
                 <a:solidFill>
                   <a:srgbClr val="0070C0"/>
                 </a:solidFill>
               </a:rPr>
-              <a:t>Coordinator</a:t>
+              <a:t>Instructor (module owner)</a:t>
             </a:r>
             <a:endParaRPr lang="en-US" b="1" dirty="0">
               <a:solidFill>
@@ -4709,6 +4541,11 @@
           <a:prstGeom prst="triangle">
             <a:avLst/>
           </a:prstGeom>
+          <a:ln>
+            <a:solidFill>
+              <a:srgbClr val="0070C0"/>
+            </a:solidFill>
+          </a:ln>
         </p:spPr>
         <p:style>
           <a:lnRef idx="2">
@@ -4779,6 +4616,11 @@
           <a:prstGeom prst="bentConnector2">
             <a:avLst/>
           </a:prstGeom>
+          <a:ln>
+            <a:solidFill>
+              <a:srgbClr val="0070C0"/>
+            </a:solidFill>
+          </a:ln>
         </p:spPr>
         <p:style>
           <a:lnRef idx="2">
@@ -4889,7 +4731,7 @@
         </p:nvCxnSpPr>
         <p:spPr>
           <a:xfrm>
-            <a:off x="2999021" y="2194719"/>
+            <a:off x="2971800" y="2194719"/>
             <a:ext cx="0" cy="533400"/>
           </a:xfrm>
           <a:prstGeom prst="line">
@@ -4897,9 +4739,7 @@
           </a:prstGeom>
           <a:ln>
             <a:solidFill>
-              <a:schemeClr val="bg1">
-                <a:lumMod val="50000"/>
-              </a:schemeClr>
+              <a:srgbClr val="0070C0"/>
             </a:solidFill>
           </a:ln>
         </p:spPr>
@@ -4937,9 +4777,7 @@
           </a:solidFill>
           <a:ln>
             <a:solidFill>
-              <a:schemeClr val="bg1">
-                <a:lumMod val="50000"/>
-              </a:schemeClr>
+              <a:srgbClr val="0070C0"/>
             </a:solidFill>
           </a:ln>
         </p:spPr>
@@ -4966,10 +4804,210 @@
           </a:p>
         </p:txBody>
       </p:sp>
+      <p:grpSp>
+        <p:nvGrpSpPr>
+          <p:cNvPr id="45" name="Group 44"/>
+          <p:cNvGrpSpPr/>
+          <p:nvPr/>
+        </p:nvGrpSpPr>
+        <p:grpSpPr>
+          <a:xfrm>
+            <a:off x="2732321" y="442119"/>
+            <a:ext cx="533400" cy="1066800"/>
+            <a:chOff x="1424781" y="1127919"/>
+            <a:chExt cx="609600" cy="1295400"/>
+          </a:xfrm>
+        </p:grpSpPr>
+        <p:sp>
+          <p:nvSpPr>
+            <p:cNvPr id="46" name="Flowchart: Connector 45"/>
+            <p:cNvSpPr/>
+            <p:nvPr/>
+          </p:nvSpPr>
+          <p:spPr>
+            <a:xfrm>
+              <a:off x="1500981" y="1127919"/>
+              <a:ext cx="457200" cy="457200"/>
+            </a:xfrm>
+            <a:prstGeom prst="flowChartConnector">
+              <a:avLst/>
+            </a:prstGeom>
+            <a:ln>
+              <a:solidFill>
+                <a:srgbClr val="0070C0"/>
+              </a:solidFill>
+            </a:ln>
+          </p:spPr>
+          <p:style>
+            <a:lnRef idx="2">
+              <a:schemeClr val="accent1"/>
+            </a:lnRef>
+            <a:fillRef idx="1">
+              <a:schemeClr val="lt1"/>
+            </a:fillRef>
+            <a:effectRef idx="0">
+              <a:schemeClr val="accent1"/>
+            </a:effectRef>
+            <a:fontRef idx="minor">
+              <a:schemeClr val="dk1"/>
+            </a:fontRef>
+          </p:style>
+          <p:txBody>
+            <a:bodyPr rtlCol="0" anchor="ctr"/>
+            <a:lstStyle/>
+            <a:p>
+              <a:pPr algn="ctr"/>
+              <a:endParaRPr lang="en-US"/>
+            </a:p>
+          </p:txBody>
+        </p:sp>
+        <p:cxnSp>
+          <p:nvCxnSpPr>
+            <p:cNvPr id="47" name="Straight Connector 46"/>
+            <p:cNvCxnSpPr>
+              <a:stCxn id="46" idx="4"/>
+            </p:cNvCxnSpPr>
+            <p:nvPr/>
+          </p:nvCxnSpPr>
+          <p:spPr>
+            <a:xfrm>
+              <a:off x="1729581" y="1585119"/>
+              <a:ext cx="0" cy="457200"/>
+            </a:xfrm>
+            <a:prstGeom prst="line">
+              <a:avLst/>
+            </a:prstGeom>
+            <a:ln>
+              <a:solidFill>
+                <a:srgbClr val="0070C0"/>
+              </a:solidFill>
+            </a:ln>
+          </p:spPr>
+          <p:style>
+            <a:lnRef idx="2">
+              <a:schemeClr val="accent1"/>
+            </a:lnRef>
+            <a:fillRef idx="1">
+              <a:schemeClr val="lt1"/>
+            </a:fillRef>
+            <a:effectRef idx="0">
+              <a:schemeClr val="accent1"/>
+            </a:effectRef>
+            <a:fontRef idx="minor">
+              <a:schemeClr val="dk1"/>
+            </a:fontRef>
+          </p:style>
+        </p:cxnSp>
+        <p:cxnSp>
+          <p:nvCxnSpPr>
+            <p:cNvPr id="48" name="Straight Connector 47"/>
+            <p:cNvCxnSpPr/>
+            <p:nvPr/>
+          </p:nvCxnSpPr>
+          <p:spPr>
+            <a:xfrm flipH="1">
+              <a:off x="1500981" y="2042319"/>
+              <a:ext cx="228600" cy="381000"/>
+            </a:xfrm>
+            <a:prstGeom prst="line">
+              <a:avLst/>
+            </a:prstGeom>
+            <a:ln>
+              <a:solidFill>
+                <a:srgbClr val="0070C0"/>
+              </a:solidFill>
+            </a:ln>
+          </p:spPr>
+          <p:style>
+            <a:lnRef idx="2">
+              <a:schemeClr val="accent1"/>
+            </a:lnRef>
+            <a:fillRef idx="1">
+              <a:schemeClr val="lt1"/>
+            </a:fillRef>
+            <a:effectRef idx="0">
+              <a:schemeClr val="accent1"/>
+            </a:effectRef>
+            <a:fontRef idx="minor">
+              <a:schemeClr val="dk1"/>
+            </a:fontRef>
+          </p:style>
+        </p:cxnSp>
+        <p:cxnSp>
+          <p:nvCxnSpPr>
+            <p:cNvPr id="49" name="Straight Connector 48"/>
+            <p:cNvCxnSpPr/>
+            <p:nvPr/>
+          </p:nvCxnSpPr>
+          <p:spPr>
+            <a:xfrm>
+              <a:off x="1729581" y="2042319"/>
+              <a:ext cx="228600" cy="381000"/>
+            </a:xfrm>
+            <a:prstGeom prst="line">
+              <a:avLst/>
+            </a:prstGeom>
+            <a:ln>
+              <a:solidFill>
+                <a:srgbClr val="0070C0"/>
+              </a:solidFill>
+            </a:ln>
+          </p:spPr>
+          <p:style>
+            <a:lnRef idx="2">
+              <a:schemeClr val="accent1"/>
+            </a:lnRef>
+            <a:fillRef idx="1">
+              <a:schemeClr val="lt1"/>
+            </a:fillRef>
+            <a:effectRef idx="0">
+              <a:schemeClr val="accent1"/>
+            </a:effectRef>
+            <a:fontRef idx="minor">
+              <a:schemeClr val="dk1"/>
+            </a:fontRef>
+          </p:style>
+        </p:cxnSp>
+        <p:cxnSp>
+          <p:nvCxnSpPr>
+            <p:cNvPr id="50" name="Straight Connector 49"/>
+            <p:cNvCxnSpPr/>
+            <p:nvPr/>
+          </p:nvCxnSpPr>
+          <p:spPr>
+            <a:xfrm>
+              <a:off x="1424781" y="1737519"/>
+              <a:ext cx="609600" cy="0"/>
+            </a:xfrm>
+            <a:prstGeom prst="line">
+              <a:avLst/>
+            </a:prstGeom>
+            <a:ln>
+              <a:solidFill>
+                <a:srgbClr val="0070C0"/>
+              </a:solidFill>
+            </a:ln>
+          </p:spPr>
+          <p:style>
+            <a:lnRef idx="2">
+              <a:schemeClr val="accent1"/>
+            </a:lnRef>
+            <a:fillRef idx="1">
+              <a:schemeClr val="lt1"/>
+            </a:fillRef>
+            <a:effectRef idx="0">
+              <a:schemeClr val="accent1"/>
+            </a:effectRef>
+            <a:fontRef idx="minor">
+              <a:schemeClr val="dk1"/>
+            </a:fontRef>
+          </p:style>
+        </p:cxnSp>
+      </p:grpSp>
     </p:spTree>
     <p:extLst>
       <p:ext uri="{BB962C8B-B14F-4D97-AF65-F5344CB8AC3E}">
-        <p14:creationId xmlns="" xmlns:p14="http://schemas.microsoft.com/office/powerpoint/2010/main" val="2312643091"/>
+        <p14:creationId xmlns:p14="http://schemas.microsoft.com/office/powerpoint/2010/main" val="2312643091"/>
       </p:ext>
     </p:extLst>
   </p:cSld>

</xml_diff>

<commit_message>
Update Issue 357 Merge and resolve conflicts
</commit_message>
<xml_diff>
--- a/doc/diagrams/Actors.pptx
+++ b/doc/diagrams/Actors.pptx
@@ -193,7 +193,7 @@
             <a:fld id="{DC50A2AC-D691-437C-A69B-81ECFE08AD4B}" type="datetimeFigureOut">
               <a:rPr lang="en-SG" smtClean="0"/>
               <a:pPr/>
-              <a:t>28/8/2012</a:t>
+              <a:t>1/12/2012</a:t>
             </a:fld>
             <a:endParaRPr lang="en-SG"/>
           </a:p>
@@ -362,7 +362,7 @@
     </p:spTree>
     <p:extLst>
       <p:ext uri="{BB962C8B-B14F-4D97-AF65-F5344CB8AC3E}">
-        <p14:creationId xmlns="" xmlns:p14="http://schemas.microsoft.com/office/powerpoint/2010/main" val="2265103329"/>
+        <p14:creationId xmlns:p14="http://schemas.microsoft.com/office/powerpoint/2010/main" val="2265103329"/>
       </p:ext>
     </p:extLst>
   </p:cSld>
@@ -542,7 +542,7 @@
     </p:spTree>
     <p:extLst>
       <p:ext uri="{BB962C8B-B14F-4D97-AF65-F5344CB8AC3E}">
-        <p14:creationId xmlns="" xmlns:p14="http://schemas.microsoft.com/office/powerpoint/2010/main" val="1558229004"/>
+        <p14:creationId xmlns:p14="http://schemas.microsoft.com/office/powerpoint/2010/main" val="1558229004"/>
       </p:ext>
     </p:extLst>
   </p:cSld>
@@ -734,7 +734,7 @@
             <a:fld id="{1D8BD707-D9CF-40AE-B4C6-C98DA3205C09}" type="datetimeFigureOut">
               <a:rPr lang="en-US" smtClean="0"/>
               <a:pPr/>
-              <a:t>8/28/2012</a:t>
+              <a:t>12/1/2012</a:t>
             </a:fld>
             <a:endParaRPr lang="en-US"/>
           </a:p>
@@ -901,7 +901,7 @@
             <a:fld id="{1D8BD707-D9CF-40AE-B4C6-C98DA3205C09}" type="datetimeFigureOut">
               <a:rPr lang="en-US" smtClean="0"/>
               <a:pPr/>
-              <a:t>8/28/2012</a:t>
+              <a:t>12/1/2012</a:t>
             </a:fld>
             <a:endParaRPr lang="en-US"/>
           </a:p>
@@ -1078,7 +1078,7 @@
             <a:fld id="{1D8BD707-D9CF-40AE-B4C6-C98DA3205C09}" type="datetimeFigureOut">
               <a:rPr lang="en-US" smtClean="0"/>
               <a:pPr/>
-              <a:t>8/28/2012</a:t>
+              <a:t>12/1/2012</a:t>
             </a:fld>
             <a:endParaRPr lang="en-US"/>
           </a:p>
@@ -1245,7 +1245,7 @@
             <a:fld id="{1D8BD707-D9CF-40AE-B4C6-C98DA3205C09}" type="datetimeFigureOut">
               <a:rPr lang="en-US" smtClean="0"/>
               <a:pPr/>
-              <a:t>8/28/2012</a:t>
+              <a:t>12/1/2012</a:t>
             </a:fld>
             <a:endParaRPr lang="en-US"/>
           </a:p>
@@ -1488,7 +1488,7 @@
             <a:fld id="{1D8BD707-D9CF-40AE-B4C6-C98DA3205C09}" type="datetimeFigureOut">
               <a:rPr lang="en-US" smtClean="0"/>
               <a:pPr/>
-              <a:t>8/28/2012</a:t>
+              <a:t>12/1/2012</a:t>
             </a:fld>
             <a:endParaRPr lang="en-US"/>
           </a:p>
@@ -1773,7 +1773,7 @@
             <a:fld id="{1D8BD707-D9CF-40AE-B4C6-C98DA3205C09}" type="datetimeFigureOut">
               <a:rPr lang="en-US" smtClean="0"/>
               <a:pPr/>
-              <a:t>8/28/2012</a:t>
+              <a:t>12/1/2012</a:t>
             </a:fld>
             <a:endParaRPr lang="en-US"/>
           </a:p>
@@ -2192,7 +2192,7 @@
             <a:fld id="{1D8BD707-D9CF-40AE-B4C6-C98DA3205C09}" type="datetimeFigureOut">
               <a:rPr lang="en-US" smtClean="0"/>
               <a:pPr/>
-              <a:t>8/28/2012</a:t>
+              <a:t>12/1/2012</a:t>
             </a:fld>
             <a:endParaRPr lang="en-US"/>
           </a:p>
@@ -2307,7 +2307,7 @@
             <a:fld id="{1D8BD707-D9CF-40AE-B4C6-C98DA3205C09}" type="datetimeFigureOut">
               <a:rPr lang="en-US" smtClean="0"/>
               <a:pPr/>
-              <a:t>8/28/2012</a:t>
+              <a:t>12/1/2012</a:t>
             </a:fld>
             <a:endParaRPr lang="en-US"/>
           </a:p>
@@ -2399,7 +2399,7 @@
             <a:fld id="{1D8BD707-D9CF-40AE-B4C6-C98DA3205C09}" type="datetimeFigureOut">
               <a:rPr lang="en-US" smtClean="0"/>
               <a:pPr/>
-              <a:t>8/28/2012</a:t>
+              <a:t>12/1/2012</a:t>
             </a:fld>
             <a:endParaRPr lang="en-US"/>
           </a:p>
@@ -2673,7 +2673,7 @@
             <a:fld id="{1D8BD707-D9CF-40AE-B4C6-C98DA3205C09}" type="datetimeFigureOut">
               <a:rPr lang="en-US" smtClean="0"/>
               <a:pPr/>
-              <a:t>8/28/2012</a:t>
+              <a:t>12/1/2012</a:t>
             </a:fld>
             <a:endParaRPr lang="en-US"/>
           </a:p>
@@ -2923,7 +2923,7 @@
             <a:fld id="{1D8BD707-D9CF-40AE-B4C6-C98DA3205C09}" type="datetimeFigureOut">
               <a:rPr lang="en-US" smtClean="0"/>
               <a:pPr/>
-              <a:t>8/28/2012</a:t>
+              <a:t>12/1/2012</a:t>
             </a:fld>
             <a:endParaRPr lang="en-US"/>
           </a:p>
@@ -3133,7 +3133,7 @@
             <a:fld id="{1D8BD707-D9CF-40AE-B4C6-C98DA3205C09}" type="datetimeFigureOut">
               <a:rPr lang="en-US" smtClean="0"/>
               <a:pPr/>
-              <a:t>8/28/2012</a:t>
+              <a:t>12/1/2012</a:t>
             </a:fld>
             <a:endParaRPr lang="en-US"/>
           </a:p>
@@ -3532,6 +3532,11 @@
             <a:prstGeom prst="flowChartConnector">
               <a:avLst/>
             </a:prstGeom>
+            <a:ln>
+              <a:solidFill>
+                <a:schemeClr val="accent6"/>
+              </a:solidFill>
+            </a:ln>
           </p:spPr>
           <p:style>
             <a:lnRef idx="2">
@@ -3572,6 +3577,11 @@
             <a:prstGeom prst="line">
               <a:avLst/>
             </a:prstGeom>
+            <a:ln>
+              <a:solidFill>
+                <a:schemeClr val="accent6"/>
+              </a:solidFill>
+            </a:ln>
           </p:spPr>
           <p:style>
             <a:lnRef idx="2">
@@ -3602,6 +3612,11 @@
             <a:prstGeom prst="line">
               <a:avLst/>
             </a:prstGeom>
+            <a:ln>
+              <a:solidFill>
+                <a:schemeClr val="accent6"/>
+              </a:solidFill>
+            </a:ln>
           </p:spPr>
           <p:style>
             <a:lnRef idx="2">
@@ -3632,6 +3647,11 @@
             <a:prstGeom prst="line">
               <a:avLst/>
             </a:prstGeom>
+            <a:ln>
+              <a:solidFill>
+                <a:schemeClr val="accent6"/>
+              </a:solidFill>
+            </a:ln>
           </p:spPr>
           <p:style>
             <a:lnRef idx="2">
@@ -3662,6 +3682,11 @@
             <a:prstGeom prst="line">
               <a:avLst/>
             </a:prstGeom>
+            <a:ln>
+              <a:solidFill>
+                <a:schemeClr val="accent6"/>
+              </a:solidFill>
+            </a:ln>
           </p:spPr>
           <p:style>
             <a:lnRef idx="2">
@@ -3919,14 +3944,14 @@
             <a:r>
               <a:rPr lang="en-US" b="1" dirty="0" smtClean="0">
                 <a:solidFill>
-                  <a:srgbClr val="0070C0"/>
+                  <a:schemeClr val="accent6"/>
                 </a:solidFill>
               </a:rPr>
               <a:t>Student</a:t>
             </a:r>
             <a:endParaRPr lang="en-US" b="1" dirty="0">
               <a:solidFill>
-                <a:srgbClr val="0070C0"/>
+                <a:schemeClr val="accent6"/>
               </a:solidFill>
             </a:endParaRPr>
           </a:p>
@@ -3974,221 +3999,6 @@
           </a:p>
         </p:txBody>
       </p:sp>
-      <p:grpSp>
-        <p:nvGrpSpPr>
-          <p:cNvPr id="234" name="Group 233"/>
-          <p:cNvGrpSpPr/>
-          <p:nvPr/>
-        </p:nvGrpSpPr>
-        <p:grpSpPr>
-          <a:xfrm>
-            <a:off x="2720181" y="442119"/>
-            <a:ext cx="533400" cy="1066800"/>
-            <a:chOff x="1424781" y="1127919"/>
-            <a:chExt cx="609600" cy="1295400"/>
-          </a:xfrm>
-        </p:grpSpPr>
-        <p:sp>
-          <p:nvSpPr>
-            <p:cNvPr id="235" name="Flowchart: Connector 234"/>
-            <p:cNvSpPr/>
-            <p:nvPr/>
-          </p:nvSpPr>
-          <p:spPr>
-            <a:xfrm>
-              <a:off x="1500981" y="1127919"/>
-              <a:ext cx="457200" cy="457200"/>
-            </a:xfrm>
-            <a:prstGeom prst="flowChartConnector">
-              <a:avLst/>
-            </a:prstGeom>
-            <a:ln>
-              <a:solidFill>
-                <a:schemeClr val="bg1">
-                  <a:lumMod val="50000"/>
-                </a:schemeClr>
-              </a:solidFill>
-              <a:prstDash val="sysDot"/>
-            </a:ln>
-          </p:spPr>
-          <p:style>
-            <a:lnRef idx="2">
-              <a:schemeClr val="accent1"/>
-            </a:lnRef>
-            <a:fillRef idx="1">
-              <a:schemeClr val="lt1"/>
-            </a:fillRef>
-            <a:effectRef idx="0">
-              <a:schemeClr val="accent1"/>
-            </a:effectRef>
-            <a:fontRef idx="minor">
-              <a:schemeClr val="dk1"/>
-            </a:fontRef>
-          </p:style>
-          <p:txBody>
-            <a:bodyPr rtlCol="0" anchor="ctr"/>
-            <a:lstStyle/>
-            <a:p>
-              <a:pPr algn="ctr"/>
-              <a:endParaRPr lang="en-US"/>
-            </a:p>
-          </p:txBody>
-        </p:sp>
-        <p:cxnSp>
-          <p:nvCxnSpPr>
-            <p:cNvPr id="236" name="Straight Connector 235"/>
-            <p:cNvCxnSpPr>
-              <a:stCxn id="235" idx="4"/>
-            </p:cNvCxnSpPr>
-            <p:nvPr/>
-          </p:nvCxnSpPr>
-          <p:spPr>
-            <a:xfrm>
-              <a:off x="1729581" y="1585119"/>
-              <a:ext cx="0" cy="457200"/>
-            </a:xfrm>
-            <a:prstGeom prst="line">
-              <a:avLst/>
-            </a:prstGeom>
-            <a:ln>
-              <a:solidFill>
-                <a:schemeClr val="bg1">
-                  <a:lumMod val="50000"/>
-                </a:schemeClr>
-              </a:solidFill>
-              <a:prstDash val="sysDot"/>
-            </a:ln>
-          </p:spPr>
-          <p:style>
-            <a:lnRef idx="2">
-              <a:schemeClr val="accent1"/>
-            </a:lnRef>
-            <a:fillRef idx="1">
-              <a:schemeClr val="lt1"/>
-            </a:fillRef>
-            <a:effectRef idx="0">
-              <a:schemeClr val="accent1"/>
-            </a:effectRef>
-            <a:fontRef idx="minor">
-              <a:schemeClr val="dk1"/>
-            </a:fontRef>
-          </p:style>
-        </p:cxnSp>
-        <p:cxnSp>
-          <p:nvCxnSpPr>
-            <p:cNvPr id="237" name="Straight Connector 236"/>
-            <p:cNvCxnSpPr/>
-            <p:nvPr/>
-          </p:nvCxnSpPr>
-          <p:spPr>
-            <a:xfrm flipH="1">
-              <a:off x="1500981" y="2042319"/>
-              <a:ext cx="228600" cy="381000"/>
-            </a:xfrm>
-            <a:prstGeom prst="line">
-              <a:avLst/>
-            </a:prstGeom>
-            <a:ln>
-              <a:solidFill>
-                <a:schemeClr val="bg1">
-                  <a:lumMod val="50000"/>
-                </a:schemeClr>
-              </a:solidFill>
-              <a:prstDash val="sysDot"/>
-            </a:ln>
-          </p:spPr>
-          <p:style>
-            <a:lnRef idx="2">
-              <a:schemeClr val="accent1"/>
-            </a:lnRef>
-            <a:fillRef idx="1">
-              <a:schemeClr val="lt1"/>
-            </a:fillRef>
-            <a:effectRef idx="0">
-              <a:schemeClr val="accent1"/>
-            </a:effectRef>
-            <a:fontRef idx="minor">
-              <a:schemeClr val="dk1"/>
-            </a:fontRef>
-          </p:style>
-        </p:cxnSp>
-        <p:cxnSp>
-          <p:nvCxnSpPr>
-            <p:cNvPr id="238" name="Straight Connector 237"/>
-            <p:cNvCxnSpPr/>
-            <p:nvPr/>
-          </p:nvCxnSpPr>
-          <p:spPr>
-            <a:xfrm>
-              <a:off x="1729581" y="2042319"/>
-              <a:ext cx="228600" cy="381000"/>
-            </a:xfrm>
-            <a:prstGeom prst="line">
-              <a:avLst/>
-            </a:prstGeom>
-            <a:ln>
-              <a:solidFill>
-                <a:schemeClr val="bg1">
-                  <a:lumMod val="50000"/>
-                </a:schemeClr>
-              </a:solidFill>
-              <a:prstDash val="sysDot"/>
-            </a:ln>
-          </p:spPr>
-          <p:style>
-            <a:lnRef idx="2">
-              <a:schemeClr val="accent1"/>
-            </a:lnRef>
-            <a:fillRef idx="1">
-              <a:schemeClr val="lt1"/>
-            </a:fillRef>
-            <a:effectRef idx="0">
-              <a:schemeClr val="accent1"/>
-            </a:effectRef>
-            <a:fontRef idx="minor">
-              <a:schemeClr val="dk1"/>
-            </a:fontRef>
-          </p:style>
-        </p:cxnSp>
-        <p:cxnSp>
-          <p:nvCxnSpPr>
-            <p:cNvPr id="239" name="Straight Connector 238"/>
-            <p:cNvCxnSpPr/>
-            <p:nvPr/>
-          </p:nvCxnSpPr>
-          <p:spPr>
-            <a:xfrm>
-              <a:off x="1424781" y="1737519"/>
-              <a:ext cx="609600" cy="0"/>
-            </a:xfrm>
-            <a:prstGeom prst="line">
-              <a:avLst/>
-            </a:prstGeom>
-            <a:ln>
-              <a:solidFill>
-                <a:schemeClr val="bg1">
-                  <a:lumMod val="50000"/>
-                </a:schemeClr>
-              </a:solidFill>
-              <a:prstDash val="sysDot"/>
-            </a:ln>
-          </p:spPr>
-          <p:style>
-            <a:lnRef idx="2">
-              <a:schemeClr val="accent1"/>
-            </a:lnRef>
-            <a:fillRef idx="1">
-              <a:schemeClr val="lt1"/>
-            </a:fillRef>
-            <a:effectRef idx="0">
-              <a:schemeClr val="accent1"/>
-            </a:effectRef>
-            <a:fontRef idx="minor">
-              <a:schemeClr val="dk1"/>
-            </a:fontRef>
-          </p:style>
-        </p:cxnSp>
-      </p:grpSp>
       <p:sp>
         <p:nvSpPr>
           <p:cNvPr id="240" name="TextBox 239"/>
@@ -4197,7 +4007,7 @@
         </p:nvSpPr>
         <p:spPr>
           <a:xfrm>
-            <a:off x="2567781" y="1585119"/>
+            <a:off x="2438400" y="1585119"/>
             <a:ext cx="1143000" cy="353943"/>
           </a:xfrm>
           <a:prstGeom prst="rect">
@@ -4214,18 +4024,14 @@
             <a:r>
               <a:rPr lang="en-US" b="1" dirty="0" smtClean="0">
                 <a:solidFill>
-                  <a:schemeClr val="bg1">
-                    <a:lumMod val="50000"/>
-                  </a:schemeClr>
+                  <a:srgbClr val="0070C0"/>
                 </a:solidFill>
               </a:rPr>
               <a:t>Instructor</a:t>
             </a:r>
             <a:endParaRPr lang="en-US" b="1" dirty="0">
               <a:solidFill>
-                <a:schemeClr val="bg1">
-                  <a:lumMod val="50000"/>
-                </a:schemeClr>
+                <a:srgbClr val="0070C0"/>
               </a:solidFill>
             </a:endParaRPr>
           </a:p>
@@ -4239,7 +4045,7 @@
         </p:nvGrpSpPr>
         <p:grpSpPr>
           <a:xfrm>
-            <a:off x="2720181" y="2956719"/>
+            <a:off x="2720181" y="2804319"/>
             <a:ext cx="533400" cy="1066800"/>
             <a:chOff x="1424781" y="1127919"/>
             <a:chExt cx="609600" cy="1295400"/>
@@ -4259,6 +4065,11 @@
             <a:prstGeom prst="flowChartConnector">
               <a:avLst/>
             </a:prstGeom>
+            <a:ln>
+              <a:solidFill>
+                <a:srgbClr val="0070C0"/>
+              </a:solidFill>
+            </a:ln>
           </p:spPr>
           <p:style>
             <a:lnRef idx="2">
@@ -4299,6 +4110,11 @@
             <a:prstGeom prst="line">
               <a:avLst/>
             </a:prstGeom>
+            <a:ln>
+              <a:solidFill>
+                <a:srgbClr val="0070C0"/>
+              </a:solidFill>
+            </a:ln>
           </p:spPr>
           <p:style>
             <a:lnRef idx="2">
@@ -4329,6 +4145,11 @@
             <a:prstGeom prst="line">
               <a:avLst/>
             </a:prstGeom>
+            <a:ln>
+              <a:solidFill>
+                <a:srgbClr val="0070C0"/>
+              </a:solidFill>
+            </a:ln>
           </p:spPr>
           <p:style>
             <a:lnRef idx="2">
@@ -4359,6 +4180,11 @@
             <a:prstGeom prst="line">
               <a:avLst/>
             </a:prstGeom>
+            <a:ln>
+              <a:solidFill>
+                <a:srgbClr val="0070C0"/>
+              </a:solidFill>
+            </a:ln>
           </p:spPr>
           <p:style>
             <a:lnRef idx="2">
@@ -4389,6 +4215,11 @@
             <a:prstGeom prst="line">
               <a:avLst/>
             </a:prstGeom>
+            <a:ln>
+              <a:solidFill>
+                <a:srgbClr val="0070C0"/>
+              </a:solidFill>
+            </a:ln>
           </p:spPr>
           <p:style>
             <a:lnRef idx="2">
@@ -4414,8 +4245,8 @@
         </p:nvSpPr>
         <p:spPr>
           <a:xfrm>
-            <a:off x="2415381" y="4023519"/>
-            <a:ext cx="1295400" cy="353943"/>
+            <a:off x="2057400" y="3794919"/>
+            <a:ext cx="1699419" cy="615553"/>
           </a:xfrm>
           <a:prstGeom prst="rect">
             <a:avLst/>
@@ -4428,13 +4259,14 @@
           </a:bodyPr>
           <a:lstStyle/>
           <a:p>
+            <a:pPr algn="ctr"/>
             <a:r>
               <a:rPr lang="en-US" b="1" dirty="0" smtClean="0">
                 <a:solidFill>
                   <a:srgbClr val="0070C0"/>
                 </a:solidFill>
               </a:rPr>
-              <a:t>Coordinator</a:t>
+              <a:t>Instructor (module owner)</a:t>
             </a:r>
             <a:endParaRPr lang="en-US" b="1" dirty="0">
               <a:solidFill>
@@ -4709,6 +4541,11 @@
           <a:prstGeom prst="triangle">
             <a:avLst/>
           </a:prstGeom>
+          <a:ln>
+            <a:solidFill>
+              <a:srgbClr val="0070C0"/>
+            </a:solidFill>
+          </a:ln>
         </p:spPr>
         <p:style>
           <a:lnRef idx="2">
@@ -4779,6 +4616,11 @@
           <a:prstGeom prst="bentConnector2">
             <a:avLst/>
           </a:prstGeom>
+          <a:ln>
+            <a:solidFill>
+              <a:srgbClr val="0070C0"/>
+            </a:solidFill>
+          </a:ln>
         </p:spPr>
         <p:style>
           <a:lnRef idx="2">
@@ -4889,7 +4731,7 @@
         </p:nvCxnSpPr>
         <p:spPr>
           <a:xfrm>
-            <a:off x="2999021" y="2194719"/>
+            <a:off x="2971800" y="2194719"/>
             <a:ext cx="0" cy="533400"/>
           </a:xfrm>
           <a:prstGeom prst="line">
@@ -4897,9 +4739,7 @@
           </a:prstGeom>
           <a:ln>
             <a:solidFill>
-              <a:schemeClr val="bg1">
-                <a:lumMod val="50000"/>
-              </a:schemeClr>
+              <a:srgbClr val="0070C0"/>
             </a:solidFill>
           </a:ln>
         </p:spPr>
@@ -4937,9 +4777,7 @@
           </a:solidFill>
           <a:ln>
             <a:solidFill>
-              <a:schemeClr val="bg1">
-                <a:lumMod val="50000"/>
-              </a:schemeClr>
+              <a:srgbClr val="0070C0"/>
             </a:solidFill>
           </a:ln>
         </p:spPr>
@@ -4966,10 +4804,210 @@
           </a:p>
         </p:txBody>
       </p:sp>
+      <p:grpSp>
+        <p:nvGrpSpPr>
+          <p:cNvPr id="45" name="Group 44"/>
+          <p:cNvGrpSpPr/>
+          <p:nvPr/>
+        </p:nvGrpSpPr>
+        <p:grpSpPr>
+          <a:xfrm>
+            <a:off x="2732321" y="442119"/>
+            <a:ext cx="533400" cy="1066800"/>
+            <a:chOff x="1424781" y="1127919"/>
+            <a:chExt cx="609600" cy="1295400"/>
+          </a:xfrm>
+        </p:grpSpPr>
+        <p:sp>
+          <p:nvSpPr>
+            <p:cNvPr id="46" name="Flowchart: Connector 45"/>
+            <p:cNvSpPr/>
+            <p:nvPr/>
+          </p:nvSpPr>
+          <p:spPr>
+            <a:xfrm>
+              <a:off x="1500981" y="1127919"/>
+              <a:ext cx="457200" cy="457200"/>
+            </a:xfrm>
+            <a:prstGeom prst="flowChartConnector">
+              <a:avLst/>
+            </a:prstGeom>
+            <a:ln>
+              <a:solidFill>
+                <a:srgbClr val="0070C0"/>
+              </a:solidFill>
+            </a:ln>
+          </p:spPr>
+          <p:style>
+            <a:lnRef idx="2">
+              <a:schemeClr val="accent1"/>
+            </a:lnRef>
+            <a:fillRef idx="1">
+              <a:schemeClr val="lt1"/>
+            </a:fillRef>
+            <a:effectRef idx="0">
+              <a:schemeClr val="accent1"/>
+            </a:effectRef>
+            <a:fontRef idx="minor">
+              <a:schemeClr val="dk1"/>
+            </a:fontRef>
+          </p:style>
+          <p:txBody>
+            <a:bodyPr rtlCol="0" anchor="ctr"/>
+            <a:lstStyle/>
+            <a:p>
+              <a:pPr algn="ctr"/>
+              <a:endParaRPr lang="en-US"/>
+            </a:p>
+          </p:txBody>
+        </p:sp>
+        <p:cxnSp>
+          <p:nvCxnSpPr>
+            <p:cNvPr id="47" name="Straight Connector 46"/>
+            <p:cNvCxnSpPr>
+              <a:stCxn id="46" idx="4"/>
+            </p:cNvCxnSpPr>
+            <p:nvPr/>
+          </p:nvCxnSpPr>
+          <p:spPr>
+            <a:xfrm>
+              <a:off x="1729581" y="1585119"/>
+              <a:ext cx="0" cy="457200"/>
+            </a:xfrm>
+            <a:prstGeom prst="line">
+              <a:avLst/>
+            </a:prstGeom>
+            <a:ln>
+              <a:solidFill>
+                <a:srgbClr val="0070C0"/>
+              </a:solidFill>
+            </a:ln>
+          </p:spPr>
+          <p:style>
+            <a:lnRef idx="2">
+              <a:schemeClr val="accent1"/>
+            </a:lnRef>
+            <a:fillRef idx="1">
+              <a:schemeClr val="lt1"/>
+            </a:fillRef>
+            <a:effectRef idx="0">
+              <a:schemeClr val="accent1"/>
+            </a:effectRef>
+            <a:fontRef idx="minor">
+              <a:schemeClr val="dk1"/>
+            </a:fontRef>
+          </p:style>
+        </p:cxnSp>
+        <p:cxnSp>
+          <p:nvCxnSpPr>
+            <p:cNvPr id="48" name="Straight Connector 47"/>
+            <p:cNvCxnSpPr/>
+            <p:nvPr/>
+          </p:nvCxnSpPr>
+          <p:spPr>
+            <a:xfrm flipH="1">
+              <a:off x="1500981" y="2042319"/>
+              <a:ext cx="228600" cy="381000"/>
+            </a:xfrm>
+            <a:prstGeom prst="line">
+              <a:avLst/>
+            </a:prstGeom>
+            <a:ln>
+              <a:solidFill>
+                <a:srgbClr val="0070C0"/>
+              </a:solidFill>
+            </a:ln>
+          </p:spPr>
+          <p:style>
+            <a:lnRef idx="2">
+              <a:schemeClr val="accent1"/>
+            </a:lnRef>
+            <a:fillRef idx="1">
+              <a:schemeClr val="lt1"/>
+            </a:fillRef>
+            <a:effectRef idx="0">
+              <a:schemeClr val="accent1"/>
+            </a:effectRef>
+            <a:fontRef idx="minor">
+              <a:schemeClr val="dk1"/>
+            </a:fontRef>
+          </p:style>
+        </p:cxnSp>
+        <p:cxnSp>
+          <p:nvCxnSpPr>
+            <p:cNvPr id="49" name="Straight Connector 48"/>
+            <p:cNvCxnSpPr/>
+            <p:nvPr/>
+          </p:nvCxnSpPr>
+          <p:spPr>
+            <a:xfrm>
+              <a:off x="1729581" y="2042319"/>
+              <a:ext cx="228600" cy="381000"/>
+            </a:xfrm>
+            <a:prstGeom prst="line">
+              <a:avLst/>
+            </a:prstGeom>
+            <a:ln>
+              <a:solidFill>
+                <a:srgbClr val="0070C0"/>
+              </a:solidFill>
+            </a:ln>
+          </p:spPr>
+          <p:style>
+            <a:lnRef idx="2">
+              <a:schemeClr val="accent1"/>
+            </a:lnRef>
+            <a:fillRef idx="1">
+              <a:schemeClr val="lt1"/>
+            </a:fillRef>
+            <a:effectRef idx="0">
+              <a:schemeClr val="accent1"/>
+            </a:effectRef>
+            <a:fontRef idx="minor">
+              <a:schemeClr val="dk1"/>
+            </a:fontRef>
+          </p:style>
+        </p:cxnSp>
+        <p:cxnSp>
+          <p:nvCxnSpPr>
+            <p:cNvPr id="50" name="Straight Connector 49"/>
+            <p:cNvCxnSpPr/>
+            <p:nvPr/>
+          </p:nvCxnSpPr>
+          <p:spPr>
+            <a:xfrm>
+              <a:off x="1424781" y="1737519"/>
+              <a:ext cx="609600" cy="0"/>
+            </a:xfrm>
+            <a:prstGeom prst="line">
+              <a:avLst/>
+            </a:prstGeom>
+            <a:ln>
+              <a:solidFill>
+                <a:srgbClr val="0070C0"/>
+              </a:solidFill>
+            </a:ln>
+          </p:spPr>
+          <p:style>
+            <a:lnRef idx="2">
+              <a:schemeClr val="accent1"/>
+            </a:lnRef>
+            <a:fillRef idx="1">
+              <a:schemeClr val="lt1"/>
+            </a:fillRef>
+            <a:effectRef idx="0">
+              <a:schemeClr val="accent1"/>
+            </a:effectRef>
+            <a:fontRef idx="minor">
+              <a:schemeClr val="dk1"/>
+            </a:fontRef>
+          </p:style>
+        </p:cxnSp>
+      </p:grpSp>
     </p:spTree>
     <p:extLst>
       <p:ext uri="{BB962C8B-B14F-4D97-AF65-F5344CB8AC3E}">
-        <p14:creationId xmlns="" xmlns:p14="http://schemas.microsoft.com/office/powerpoint/2010/main" val="2312643091"/>
+        <p14:creationId xmlns:p14="http://schemas.microsoft.com/office/powerpoint/2010/main" val="2312643091"/>
       </p:ext>
     </p:extLst>
   </p:cSld>

</xml_diff>

<commit_message>
Issue 978: Spec: update to match V4.55 Update Issue 978
</commit_message>
<xml_diff>
--- a/doc/diagrams/Actors.pptx
+++ b/doc/diagrams/Actors.pptx
@@ -10,7 +10,7 @@
   <p:sldIdLst>
     <p:sldId id="256" r:id="rId2"/>
   </p:sldIdLst>
-  <p:sldSz cx="3657600" cy="5761038"/>
+  <p:sldSz cx="3657600" cy="4321175"/>
   <p:notesSz cx="6858000" cy="9144000"/>
   <p:defaultTextStyle>
     <a:defPPr>
@@ -193,7 +193,7 @@
             <a:fld id="{DC50A2AC-D691-437C-A69B-81ECFE08AD4B}" type="datetimeFigureOut">
               <a:rPr lang="en-SG" smtClean="0"/>
               <a:pPr/>
-              <a:t>1/12/2012</a:t>
+              <a:t>6/7/2013</a:t>
             </a:fld>
             <a:endParaRPr lang="en-SG"/>
           </a:p>
@@ -211,8 +211,8 @@
         </p:nvSpPr>
         <p:spPr>
           <a:xfrm>
-            <a:off x="2339975" y="685800"/>
-            <a:ext cx="2178050" cy="3429000"/>
+            <a:off x="1978025" y="685800"/>
+            <a:ext cx="2901950" cy="3429000"/>
           </a:xfrm>
           <a:prstGeom prst="rect">
             <a:avLst/>
@@ -491,8 +491,8 @@
         </p:nvSpPr>
         <p:spPr>
           <a:xfrm>
-            <a:off x="2339975" y="685800"/>
-            <a:ext cx="2178050" cy="3429000"/>
+            <a:off x="1978025" y="685800"/>
+            <a:ext cx="2901950" cy="3429000"/>
           </a:xfrm>
         </p:spPr>
       </p:sp>
@@ -581,8 +581,8 @@
         </p:nvSpPr>
         <p:spPr>
           <a:xfrm>
-            <a:off x="274320" y="1789656"/>
-            <a:ext cx="3108960" cy="1234890"/>
+            <a:off x="274320" y="1342365"/>
+            <a:ext cx="3108960" cy="926252"/>
           </a:xfrm>
         </p:spPr>
         <p:txBody>
@@ -609,8 +609,8 @@
         </p:nvSpPr>
         <p:spPr>
           <a:xfrm>
-            <a:off x="548640" y="3264588"/>
-            <a:ext cx="2560320" cy="1472266"/>
+            <a:off x="548640" y="2448666"/>
+            <a:ext cx="2560320" cy="1104301"/>
           </a:xfrm>
         </p:spPr>
         <p:txBody>
@@ -734,7 +734,7 @@
             <a:fld id="{1D8BD707-D9CF-40AE-B4C6-C98DA3205C09}" type="datetimeFigureOut">
               <a:rPr lang="en-US" smtClean="0"/>
               <a:pPr/>
-              <a:t>12/1/2012</a:t>
+              <a:t>7/6/2013</a:t>
             </a:fld>
             <a:endParaRPr lang="en-US"/>
           </a:p>
@@ -901,7 +901,7 @@
             <a:fld id="{1D8BD707-D9CF-40AE-B4C6-C98DA3205C09}" type="datetimeFigureOut">
               <a:rPr lang="en-US" smtClean="0"/>
               <a:pPr/>
-              <a:t>12/1/2012</a:t>
+              <a:t>7/6/2013</a:t>
             </a:fld>
             <a:endParaRPr lang="en-US"/>
           </a:p>
@@ -987,8 +987,8 @@
         </p:nvSpPr>
         <p:spPr>
           <a:xfrm>
-            <a:off x="2651760" y="230710"/>
-            <a:ext cx="822960" cy="4915552"/>
+            <a:off x="2651760" y="173049"/>
+            <a:ext cx="822960" cy="3687002"/>
           </a:xfrm>
         </p:spPr>
         <p:txBody>
@@ -1015,8 +1015,8 @@
         </p:nvSpPr>
         <p:spPr>
           <a:xfrm>
-            <a:off x="182880" y="230710"/>
-            <a:ext cx="2407920" cy="4915552"/>
+            <a:off x="182880" y="173049"/>
+            <a:ext cx="2407920" cy="3687002"/>
           </a:xfrm>
         </p:spPr>
         <p:txBody>
@@ -1078,7 +1078,7 @@
             <a:fld id="{1D8BD707-D9CF-40AE-B4C6-C98DA3205C09}" type="datetimeFigureOut">
               <a:rPr lang="en-US" smtClean="0"/>
               <a:pPr/>
-              <a:t>12/1/2012</a:t>
+              <a:t>7/6/2013</a:t>
             </a:fld>
             <a:endParaRPr lang="en-US"/>
           </a:p>
@@ -1245,7 +1245,7 @@
             <a:fld id="{1D8BD707-D9CF-40AE-B4C6-C98DA3205C09}" type="datetimeFigureOut">
               <a:rPr lang="en-US" smtClean="0"/>
               <a:pPr/>
-              <a:t>12/1/2012</a:t>
+              <a:t>7/6/2013</a:t>
             </a:fld>
             <a:endParaRPr lang="en-US"/>
           </a:p>
@@ -1331,8 +1331,8 @@
         </p:nvSpPr>
         <p:spPr>
           <a:xfrm>
-            <a:off x="288925" y="3702001"/>
-            <a:ext cx="3108960" cy="1144206"/>
+            <a:off x="288925" y="2776756"/>
+            <a:ext cx="3108960" cy="858233"/>
           </a:xfrm>
         </p:spPr>
         <p:txBody>
@@ -1363,8 +1363,8 @@
         </p:nvSpPr>
         <p:spPr>
           <a:xfrm>
-            <a:off x="288925" y="2441774"/>
-            <a:ext cx="3108960" cy="1260227"/>
+            <a:off x="288925" y="1831499"/>
+            <a:ext cx="3108960" cy="945257"/>
           </a:xfrm>
         </p:spPr>
         <p:txBody>
@@ -1488,7 +1488,7 @@
             <a:fld id="{1D8BD707-D9CF-40AE-B4C6-C98DA3205C09}" type="datetimeFigureOut">
               <a:rPr lang="en-US" smtClean="0"/>
               <a:pPr/>
-              <a:t>12/1/2012</a:t>
+              <a:t>7/6/2013</a:t>
             </a:fld>
             <a:endParaRPr lang="en-US"/>
           </a:p>
@@ -1597,8 +1597,8 @@
         </p:nvSpPr>
         <p:spPr>
           <a:xfrm>
-            <a:off x="182881" y="1344242"/>
-            <a:ext cx="1615440" cy="3802019"/>
+            <a:off x="182881" y="1008274"/>
+            <a:ext cx="1615440" cy="2851776"/>
           </a:xfrm>
         </p:spPr>
         <p:txBody>
@@ -1682,8 +1682,8 @@
         </p:nvSpPr>
         <p:spPr>
           <a:xfrm>
-            <a:off x="1859280" y="1344242"/>
-            <a:ext cx="1615440" cy="3802019"/>
+            <a:off x="1859280" y="1008274"/>
+            <a:ext cx="1615440" cy="2851776"/>
           </a:xfrm>
         </p:spPr>
         <p:txBody>
@@ -1773,7 +1773,7 @@
             <a:fld id="{1D8BD707-D9CF-40AE-B4C6-C98DA3205C09}" type="datetimeFigureOut">
               <a:rPr lang="en-US" smtClean="0"/>
               <a:pPr/>
-              <a:t>12/1/2012</a:t>
+              <a:t>7/6/2013</a:t>
             </a:fld>
             <a:endParaRPr lang="en-US"/>
           </a:p>
@@ -1886,8 +1886,8 @@
         </p:nvSpPr>
         <p:spPr>
           <a:xfrm>
-            <a:off x="182880" y="1289566"/>
-            <a:ext cx="1616076" cy="537430"/>
+            <a:off x="182880" y="967263"/>
+            <a:ext cx="1616076" cy="403109"/>
           </a:xfrm>
         </p:spPr>
         <p:txBody>
@@ -1951,8 +1951,8 @@
         </p:nvSpPr>
         <p:spPr>
           <a:xfrm>
-            <a:off x="182880" y="1826997"/>
-            <a:ext cx="1616076" cy="3319265"/>
+            <a:off x="182880" y="1370374"/>
+            <a:ext cx="1616076" cy="2489677"/>
           </a:xfrm>
         </p:spPr>
         <p:txBody>
@@ -2036,8 +2036,8 @@
         </p:nvSpPr>
         <p:spPr>
           <a:xfrm>
-            <a:off x="1858011" y="1289566"/>
-            <a:ext cx="1616710" cy="537430"/>
+            <a:off x="1858011" y="967263"/>
+            <a:ext cx="1616710" cy="403109"/>
           </a:xfrm>
         </p:spPr>
         <p:txBody>
@@ -2101,8 +2101,8 @@
         </p:nvSpPr>
         <p:spPr>
           <a:xfrm>
-            <a:off x="1858011" y="1826997"/>
-            <a:ext cx="1616710" cy="3319265"/>
+            <a:off x="1858011" y="1370374"/>
+            <a:ext cx="1616710" cy="2489677"/>
           </a:xfrm>
         </p:spPr>
         <p:txBody>
@@ -2192,7 +2192,7 @@
             <a:fld id="{1D8BD707-D9CF-40AE-B4C6-C98DA3205C09}" type="datetimeFigureOut">
               <a:rPr lang="en-US" smtClean="0"/>
               <a:pPr/>
-              <a:t>12/1/2012</a:t>
+              <a:t>7/6/2013</a:t>
             </a:fld>
             <a:endParaRPr lang="en-US"/>
           </a:p>
@@ -2307,7 +2307,7 @@
             <a:fld id="{1D8BD707-D9CF-40AE-B4C6-C98DA3205C09}" type="datetimeFigureOut">
               <a:rPr lang="en-US" smtClean="0"/>
               <a:pPr/>
-              <a:t>12/1/2012</a:t>
+              <a:t>7/6/2013</a:t>
             </a:fld>
             <a:endParaRPr lang="en-US"/>
           </a:p>
@@ -2399,7 +2399,7 @@
             <a:fld id="{1D8BD707-D9CF-40AE-B4C6-C98DA3205C09}" type="datetimeFigureOut">
               <a:rPr lang="en-US" smtClean="0"/>
               <a:pPr/>
-              <a:t>12/1/2012</a:t>
+              <a:t>7/6/2013</a:t>
             </a:fld>
             <a:endParaRPr lang="en-US"/>
           </a:p>
@@ -2485,8 +2485,8 @@
         </p:nvSpPr>
         <p:spPr>
           <a:xfrm>
-            <a:off x="182881" y="229375"/>
-            <a:ext cx="1203325" cy="976176"/>
+            <a:off x="182882" y="172047"/>
+            <a:ext cx="1203325" cy="732199"/>
           </a:xfrm>
         </p:spPr>
         <p:txBody>
@@ -2517,8 +2517,8 @@
         </p:nvSpPr>
         <p:spPr>
           <a:xfrm>
-            <a:off x="1430020" y="229375"/>
-            <a:ext cx="2044700" cy="4916886"/>
+            <a:off x="1430020" y="172047"/>
+            <a:ext cx="2044700" cy="3688003"/>
           </a:xfrm>
         </p:spPr>
         <p:txBody>
@@ -2602,8 +2602,8 @@
         </p:nvSpPr>
         <p:spPr>
           <a:xfrm>
-            <a:off x="182881" y="1205551"/>
-            <a:ext cx="1203325" cy="3940710"/>
+            <a:off x="182882" y="904246"/>
+            <a:ext cx="1203325" cy="2955804"/>
           </a:xfrm>
         </p:spPr>
         <p:txBody>
@@ -2673,7 +2673,7 @@
             <a:fld id="{1D8BD707-D9CF-40AE-B4C6-C98DA3205C09}" type="datetimeFigureOut">
               <a:rPr lang="en-US" smtClean="0"/>
               <a:pPr/>
-              <a:t>12/1/2012</a:t>
+              <a:t>7/6/2013</a:t>
             </a:fld>
             <a:endParaRPr lang="en-US"/>
           </a:p>
@@ -2759,8 +2759,8 @@
         </p:nvSpPr>
         <p:spPr>
           <a:xfrm>
-            <a:off x="716916" y="4032727"/>
-            <a:ext cx="2194560" cy="476086"/>
+            <a:off x="716916" y="3024823"/>
+            <a:ext cx="2194560" cy="357097"/>
           </a:xfrm>
         </p:spPr>
         <p:txBody>
@@ -2791,8 +2791,8 @@
         </p:nvSpPr>
         <p:spPr>
           <a:xfrm>
-            <a:off x="716916" y="514762"/>
-            <a:ext cx="2194560" cy="3456623"/>
+            <a:off x="716916" y="386107"/>
+            <a:ext cx="2194560" cy="2592705"/>
           </a:xfrm>
         </p:spPr>
         <p:txBody>
@@ -2852,8 +2852,8 @@
         </p:nvSpPr>
         <p:spPr>
           <a:xfrm>
-            <a:off x="716916" y="4508815"/>
-            <a:ext cx="2194560" cy="676121"/>
+            <a:off x="716916" y="3381922"/>
+            <a:ext cx="2194560" cy="507137"/>
           </a:xfrm>
         </p:spPr>
         <p:txBody>
@@ -2923,7 +2923,7 @@
             <a:fld id="{1D8BD707-D9CF-40AE-B4C6-C98DA3205C09}" type="datetimeFigureOut">
               <a:rPr lang="en-US" smtClean="0"/>
               <a:pPr/>
-              <a:t>12/1/2012</a:t>
+              <a:t>7/6/2013</a:t>
             </a:fld>
             <a:endParaRPr lang="en-US"/>
           </a:p>
@@ -3014,8 +3014,8 @@
         </p:nvSpPr>
         <p:spPr>
           <a:xfrm>
-            <a:off x="182880" y="230709"/>
-            <a:ext cx="3291840" cy="960173"/>
+            <a:off x="182880" y="173048"/>
+            <a:ext cx="3291840" cy="720196"/>
           </a:xfrm>
           <a:prstGeom prst="rect">
             <a:avLst/>
@@ -3047,8 +3047,8 @@
         </p:nvSpPr>
         <p:spPr>
           <a:xfrm>
-            <a:off x="182880" y="1344242"/>
-            <a:ext cx="3291840" cy="3802019"/>
+            <a:off x="182880" y="1008274"/>
+            <a:ext cx="3291840" cy="2851776"/>
           </a:xfrm>
           <a:prstGeom prst="rect">
             <a:avLst/>
@@ -3109,8 +3109,8 @@
         </p:nvSpPr>
         <p:spPr>
           <a:xfrm>
-            <a:off x="182880" y="5339630"/>
-            <a:ext cx="853440" cy="306722"/>
+            <a:off x="182880" y="4005090"/>
+            <a:ext cx="853440" cy="230063"/>
           </a:xfrm>
           <a:prstGeom prst="rect">
             <a:avLst/>
@@ -3133,7 +3133,7 @@
             <a:fld id="{1D8BD707-D9CF-40AE-B4C6-C98DA3205C09}" type="datetimeFigureOut">
               <a:rPr lang="en-US" smtClean="0"/>
               <a:pPr/>
-              <a:t>12/1/2012</a:t>
+              <a:t>7/6/2013</a:t>
             </a:fld>
             <a:endParaRPr lang="en-US"/>
           </a:p>
@@ -3151,8 +3151,8 @@
         </p:nvSpPr>
         <p:spPr>
           <a:xfrm>
-            <a:off x="1249681" y="5339630"/>
-            <a:ext cx="1158240" cy="306722"/>
+            <a:off x="1249681" y="4005090"/>
+            <a:ext cx="1158240" cy="230063"/>
           </a:xfrm>
           <a:prstGeom prst="rect">
             <a:avLst/>
@@ -3188,8 +3188,8 @@
         </p:nvSpPr>
         <p:spPr>
           <a:xfrm>
-            <a:off x="2621281" y="5339630"/>
-            <a:ext cx="853440" cy="306722"/>
+            <a:off x="2621281" y="4005090"/>
+            <a:ext cx="853440" cy="230063"/>
           </a:xfrm>
           <a:prstGeom prst="rect">
             <a:avLst/>
@@ -3506,13 +3506,13 @@
       </p:grpSpPr>
       <p:grpSp>
         <p:nvGrpSpPr>
-          <p:cNvPr id="220" name="Group 219"/>
+          <p:cNvPr id="51" name="Group 50"/>
           <p:cNvGrpSpPr/>
           <p:nvPr/>
         </p:nvGrpSpPr>
         <p:grpSpPr>
           <a:xfrm>
-            <a:off x="1424781" y="442119"/>
+            <a:off x="1424781" y="103187"/>
             <a:ext cx="533400" cy="1066800"/>
             <a:chOff x="1424781" y="1127919"/>
             <a:chExt cx="609600" cy="1295400"/>
@@ -3520,7 +3520,7 @@
         </p:grpSpPr>
         <p:sp>
           <p:nvSpPr>
-            <p:cNvPr id="221" name="Flowchart: Connector 220"/>
+            <p:cNvPr id="52" name="Flowchart: Connector 51"/>
             <p:cNvSpPr/>
             <p:nvPr/>
           </p:nvSpPr>
@@ -3563,9 +3563,9 @@
         </p:sp>
         <p:cxnSp>
           <p:nvCxnSpPr>
-            <p:cNvPr id="222" name="Straight Connector 221"/>
+            <p:cNvPr id="53" name="Straight Connector 52"/>
             <p:cNvCxnSpPr>
-              <a:stCxn id="221" idx="4"/>
+              <a:stCxn id="52" idx="4"/>
             </p:cNvCxnSpPr>
             <p:nvPr/>
           </p:nvCxnSpPr>
@@ -3600,7 +3600,7 @@
         </p:cxnSp>
         <p:cxnSp>
           <p:nvCxnSpPr>
-            <p:cNvPr id="223" name="Straight Connector 222"/>
+            <p:cNvPr id="54" name="Straight Connector 53"/>
             <p:cNvCxnSpPr/>
             <p:nvPr/>
           </p:nvCxnSpPr>
@@ -3635,7 +3635,7 @@
         </p:cxnSp>
         <p:cxnSp>
           <p:nvCxnSpPr>
-            <p:cNvPr id="224" name="Straight Connector 223"/>
+            <p:cNvPr id="55" name="Straight Connector 54"/>
             <p:cNvCxnSpPr/>
             <p:nvPr/>
           </p:nvCxnSpPr>
@@ -3670,7 +3670,7 @@
         </p:cxnSp>
         <p:cxnSp>
           <p:nvCxnSpPr>
-            <p:cNvPr id="225" name="Straight Connector 224"/>
+            <p:cNvPr id="56" name="Straight Connector 55"/>
             <p:cNvCxnSpPr/>
             <p:nvPr/>
           </p:nvCxnSpPr>
@@ -3706,13 +3706,13 @@
       </p:grpSp>
       <p:grpSp>
         <p:nvGrpSpPr>
-          <p:cNvPr id="226" name="Group 225"/>
+          <p:cNvPr id="57" name="Group 56"/>
           <p:cNvGrpSpPr/>
           <p:nvPr/>
         </p:nvGrpSpPr>
         <p:grpSpPr>
           <a:xfrm>
-            <a:off x="281781" y="442119"/>
+            <a:off x="281781" y="103187"/>
             <a:ext cx="533400" cy="1066800"/>
             <a:chOff x="1424781" y="1127919"/>
             <a:chExt cx="609600" cy="1295400"/>
@@ -3720,7 +3720,7 @@
         </p:grpSpPr>
         <p:sp>
           <p:nvSpPr>
-            <p:cNvPr id="227" name="Flowchart: Connector 226"/>
+            <p:cNvPr id="58" name="Flowchart: Connector 57"/>
             <p:cNvSpPr/>
             <p:nvPr/>
           </p:nvSpPr>
@@ -3766,9 +3766,9 @@
         </p:sp>
         <p:cxnSp>
           <p:nvCxnSpPr>
-            <p:cNvPr id="228" name="Straight Connector 227"/>
+            <p:cNvPr id="59" name="Straight Connector 58"/>
             <p:cNvCxnSpPr>
-              <a:stCxn id="227" idx="4"/>
+              <a:stCxn id="58" idx="4"/>
             </p:cNvCxnSpPr>
             <p:nvPr/>
           </p:nvCxnSpPr>
@@ -3806,7 +3806,7 @@
         </p:cxnSp>
         <p:cxnSp>
           <p:nvCxnSpPr>
-            <p:cNvPr id="229" name="Straight Connector 228"/>
+            <p:cNvPr id="60" name="Straight Connector 59"/>
             <p:cNvCxnSpPr/>
             <p:nvPr/>
           </p:nvCxnSpPr>
@@ -3844,7 +3844,7 @@
         </p:cxnSp>
         <p:cxnSp>
           <p:nvCxnSpPr>
-            <p:cNvPr id="230" name="Straight Connector 229"/>
+            <p:cNvPr id="61" name="Straight Connector 60"/>
             <p:cNvCxnSpPr/>
             <p:nvPr/>
           </p:nvCxnSpPr>
@@ -3882,7 +3882,7 @@
         </p:cxnSp>
         <p:cxnSp>
           <p:nvCxnSpPr>
-            <p:cNvPr id="231" name="Straight Connector 230"/>
+            <p:cNvPr id="62" name="Straight Connector 61"/>
             <p:cNvCxnSpPr/>
             <p:nvPr/>
           </p:nvCxnSpPr>
@@ -3921,13 +3921,13 @@
       </p:grpSp>
       <p:sp>
         <p:nvSpPr>
-          <p:cNvPr id="232" name="TextBox 231"/>
+          <p:cNvPr id="63" name="TextBox 62"/>
           <p:cNvSpPr txBox="1"/>
           <p:nvPr/>
         </p:nvSpPr>
         <p:spPr>
           <a:xfrm>
-            <a:off x="1272381" y="1585119"/>
+            <a:off x="1272381" y="1246187"/>
             <a:ext cx="990600" cy="353943"/>
           </a:xfrm>
           <a:prstGeom prst="rect">
@@ -3959,13 +3959,13 @@
       </p:sp>
       <p:sp>
         <p:nvSpPr>
-          <p:cNvPr id="233" name="TextBox 232"/>
+          <p:cNvPr id="64" name="TextBox 63"/>
           <p:cNvSpPr txBox="1"/>
           <p:nvPr/>
         </p:nvSpPr>
         <p:spPr>
           <a:xfrm>
-            <a:off x="129381" y="1585119"/>
+            <a:off x="129381" y="1246187"/>
             <a:ext cx="1143000" cy="353943"/>
           </a:xfrm>
           <a:prstGeom prst="rect">
@@ -4001,13 +4001,13 @@
       </p:sp>
       <p:sp>
         <p:nvSpPr>
-          <p:cNvPr id="240" name="TextBox 239"/>
+          <p:cNvPr id="65" name="TextBox 64"/>
           <p:cNvSpPr txBox="1"/>
           <p:nvPr/>
         </p:nvSpPr>
         <p:spPr>
           <a:xfrm>
-            <a:off x="2438400" y="1585119"/>
+            <a:off x="2438400" y="1246187"/>
             <a:ext cx="1143000" cy="353943"/>
           </a:xfrm>
           <a:prstGeom prst="rect">
@@ -4039,13 +4039,13 @@
       </p:sp>
       <p:grpSp>
         <p:nvGrpSpPr>
-          <p:cNvPr id="241" name="Group 240"/>
+          <p:cNvPr id="66" name="Group 65"/>
           <p:cNvGrpSpPr/>
           <p:nvPr/>
         </p:nvGrpSpPr>
         <p:grpSpPr>
           <a:xfrm>
-            <a:off x="2720181" y="2804319"/>
+            <a:off x="1424781" y="2846387"/>
             <a:ext cx="533400" cy="1066800"/>
             <a:chOff x="1424781" y="1127919"/>
             <a:chExt cx="609600" cy="1295400"/>
@@ -4053,7 +4053,455 @@
         </p:grpSpPr>
         <p:sp>
           <p:nvSpPr>
-            <p:cNvPr id="242" name="Flowchart: Connector 241"/>
+            <p:cNvPr id="67" name="Flowchart: Connector 66"/>
+            <p:cNvSpPr/>
+            <p:nvPr/>
+          </p:nvSpPr>
+          <p:spPr>
+            <a:xfrm>
+              <a:off x="1500981" y="1127919"/>
+              <a:ext cx="457200" cy="457200"/>
+            </a:xfrm>
+            <a:prstGeom prst="flowChartConnector">
+              <a:avLst/>
+            </a:prstGeom>
+          </p:spPr>
+          <p:style>
+            <a:lnRef idx="2">
+              <a:schemeClr val="accent2"/>
+            </a:lnRef>
+            <a:fillRef idx="1">
+              <a:schemeClr val="lt1"/>
+            </a:fillRef>
+            <a:effectRef idx="0">
+              <a:schemeClr val="accent2"/>
+            </a:effectRef>
+            <a:fontRef idx="minor">
+              <a:schemeClr val="dk1"/>
+            </a:fontRef>
+          </p:style>
+          <p:txBody>
+            <a:bodyPr rtlCol="0" anchor="ctr"/>
+            <a:lstStyle/>
+            <a:p>
+              <a:pPr algn="ctr"/>
+              <a:endParaRPr lang="en-US"/>
+            </a:p>
+          </p:txBody>
+        </p:sp>
+        <p:cxnSp>
+          <p:nvCxnSpPr>
+            <p:cNvPr id="68" name="Straight Connector 67"/>
+            <p:cNvCxnSpPr>
+              <a:stCxn id="67" idx="4"/>
+            </p:cNvCxnSpPr>
+            <p:nvPr/>
+          </p:nvCxnSpPr>
+          <p:spPr>
+            <a:xfrm>
+              <a:off x="1729581" y="1585119"/>
+              <a:ext cx="0" cy="457200"/>
+            </a:xfrm>
+            <a:prstGeom prst="line">
+              <a:avLst/>
+            </a:prstGeom>
+          </p:spPr>
+          <p:style>
+            <a:lnRef idx="2">
+              <a:schemeClr val="accent2"/>
+            </a:lnRef>
+            <a:fillRef idx="1">
+              <a:schemeClr val="lt1"/>
+            </a:fillRef>
+            <a:effectRef idx="0">
+              <a:schemeClr val="accent2"/>
+            </a:effectRef>
+            <a:fontRef idx="minor">
+              <a:schemeClr val="dk1"/>
+            </a:fontRef>
+          </p:style>
+        </p:cxnSp>
+        <p:cxnSp>
+          <p:nvCxnSpPr>
+            <p:cNvPr id="69" name="Straight Connector 68"/>
+            <p:cNvCxnSpPr/>
+            <p:nvPr/>
+          </p:nvCxnSpPr>
+          <p:spPr>
+            <a:xfrm flipH="1">
+              <a:off x="1500981" y="2042319"/>
+              <a:ext cx="228600" cy="381000"/>
+            </a:xfrm>
+            <a:prstGeom prst="line">
+              <a:avLst/>
+            </a:prstGeom>
+          </p:spPr>
+          <p:style>
+            <a:lnRef idx="2">
+              <a:schemeClr val="accent2"/>
+            </a:lnRef>
+            <a:fillRef idx="1">
+              <a:schemeClr val="lt1"/>
+            </a:fillRef>
+            <a:effectRef idx="0">
+              <a:schemeClr val="accent2"/>
+            </a:effectRef>
+            <a:fontRef idx="minor">
+              <a:schemeClr val="dk1"/>
+            </a:fontRef>
+          </p:style>
+        </p:cxnSp>
+        <p:cxnSp>
+          <p:nvCxnSpPr>
+            <p:cNvPr id="70" name="Straight Connector 69"/>
+            <p:cNvCxnSpPr/>
+            <p:nvPr/>
+          </p:nvCxnSpPr>
+          <p:spPr>
+            <a:xfrm>
+              <a:off x="1729581" y="2042319"/>
+              <a:ext cx="228600" cy="381000"/>
+            </a:xfrm>
+            <a:prstGeom prst="line">
+              <a:avLst/>
+            </a:prstGeom>
+          </p:spPr>
+          <p:style>
+            <a:lnRef idx="2">
+              <a:schemeClr val="accent2"/>
+            </a:lnRef>
+            <a:fillRef idx="1">
+              <a:schemeClr val="lt1"/>
+            </a:fillRef>
+            <a:effectRef idx="0">
+              <a:schemeClr val="accent2"/>
+            </a:effectRef>
+            <a:fontRef idx="minor">
+              <a:schemeClr val="dk1"/>
+            </a:fontRef>
+          </p:style>
+        </p:cxnSp>
+        <p:cxnSp>
+          <p:nvCxnSpPr>
+            <p:cNvPr id="71" name="Straight Connector 70"/>
+            <p:cNvCxnSpPr/>
+            <p:nvPr/>
+          </p:nvCxnSpPr>
+          <p:spPr>
+            <a:xfrm>
+              <a:off x="1424781" y="1737519"/>
+              <a:ext cx="609600" cy="0"/>
+            </a:xfrm>
+            <a:prstGeom prst="line">
+              <a:avLst/>
+            </a:prstGeom>
+          </p:spPr>
+          <p:style>
+            <a:lnRef idx="2">
+              <a:schemeClr val="accent2"/>
+            </a:lnRef>
+            <a:fillRef idx="1">
+              <a:schemeClr val="lt1"/>
+            </a:fillRef>
+            <a:effectRef idx="0">
+              <a:schemeClr val="accent2"/>
+            </a:effectRef>
+            <a:fontRef idx="minor">
+              <a:schemeClr val="dk1"/>
+            </a:fontRef>
+          </p:style>
+        </p:cxnSp>
+      </p:grpSp>
+      <p:sp>
+        <p:nvSpPr>
+          <p:cNvPr id="72" name="TextBox 71"/>
+          <p:cNvSpPr txBox="1"/>
+          <p:nvPr/>
+        </p:nvSpPr>
+        <p:spPr>
+          <a:xfrm>
+            <a:off x="1272381" y="3913187"/>
+            <a:ext cx="838200" cy="353943"/>
+          </a:xfrm>
+          <a:prstGeom prst="rect">
+            <a:avLst/>
+          </a:prstGeom>
+          <a:noFill/>
+        </p:spPr>
+        <p:txBody>
+          <a:bodyPr wrap="square" rtlCol="0">
+            <a:spAutoFit/>
+          </a:bodyPr>
+          <a:lstStyle/>
+          <a:p>
+            <a:r>
+              <a:rPr lang="en-US" b="1" dirty="0" smtClean="0">
+                <a:solidFill>
+                  <a:srgbClr val="C00000"/>
+                </a:solidFill>
+              </a:rPr>
+              <a:t>Admin</a:t>
+            </a:r>
+            <a:endParaRPr lang="en-US" b="1" dirty="0">
+              <a:solidFill>
+                <a:srgbClr val="C00000"/>
+              </a:solidFill>
+            </a:endParaRPr>
+          </a:p>
+        </p:txBody>
+      </p:sp>
+      <p:sp>
+        <p:nvSpPr>
+          <p:cNvPr id="73" name="Isosceles Triangle 72"/>
+          <p:cNvSpPr/>
+          <p:nvPr/>
+        </p:nvSpPr>
+        <p:spPr>
+          <a:xfrm>
+            <a:off x="1500981" y="1627187"/>
+            <a:ext cx="381000" cy="304800"/>
+          </a:xfrm>
+          <a:prstGeom prst="triangle">
+            <a:avLst/>
+          </a:prstGeom>
+        </p:spPr>
+        <p:style>
+          <a:lnRef idx="2">
+            <a:schemeClr val="accent6"/>
+          </a:lnRef>
+          <a:fillRef idx="1">
+            <a:schemeClr val="lt1"/>
+          </a:fillRef>
+          <a:effectRef idx="0">
+            <a:schemeClr val="accent6"/>
+          </a:effectRef>
+          <a:fontRef idx="minor">
+            <a:schemeClr val="dk1"/>
+          </a:fontRef>
+        </p:style>
+        <p:txBody>
+          <a:bodyPr rtlCol="0" anchor="ctr"/>
+          <a:lstStyle/>
+          <a:p>
+            <a:pPr algn="ctr"/>
+            <a:endParaRPr lang="en-US"/>
+          </a:p>
+        </p:txBody>
+      </p:sp>
+      <p:cxnSp>
+        <p:nvCxnSpPr>
+          <p:cNvPr id="74" name="Straight Connector 73"/>
+          <p:cNvCxnSpPr/>
+          <p:nvPr/>
+        </p:nvCxnSpPr>
+        <p:spPr>
+          <a:xfrm>
+            <a:off x="1683525" y="1931987"/>
+            <a:ext cx="7956" cy="762000"/>
+          </a:xfrm>
+          <a:prstGeom prst="line">
+            <a:avLst/>
+          </a:prstGeom>
+        </p:spPr>
+        <p:style>
+          <a:lnRef idx="2">
+            <a:schemeClr val="accent6"/>
+          </a:lnRef>
+          <a:fillRef idx="1">
+            <a:schemeClr val="lt1"/>
+          </a:fillRef>
+          <a:effectRef idx="0">
+            <a:schemeClr val="accent6"/>
+          </a:effectRef>
+          <a:fontRef idx="minor">
+            <a:schemeClr val="dk1"/>
+          </a:fontRef>
+        </p:style>
+      </p:cxnSp>
+      <p:cxnSp>
+        <p:nvCxnSpPr>
+          <p:cNvPr id="75" name="Shape 257"/>
+          <p:cNvCxnSpPr>
+            <a:stCxn id="78" idx="3"/>
+          </p:cNvCxnSpPr>
+          <p:nvPr/>
+        </p:nvCxnSpPr>
+        <p:spPr>
+          <a:xfrm rot="5400000">
+            <a:off x="2144703" y="1470809"/>
+            <a:ext cx="381000" cy="1303356"/>
+          </a:xfrm>
+          <a:prstGeom prst="bentConnector2">
+            <a:avLst/>
+          </a:prstGeom>
+          <a:ln>
+            <a:solidFill>
+              <a:srgbClr val="0070C0"/>
+            </a:solidFill>
+          </a:ln>
+        </p:spPr>
+        <p:style>
+          <a:lnRef idx="2">
+            <a:schemeClr val="accent6"/>
+          </a:lnRef>
+          <a:fillRef idx="1">
+            <a:schemeClr val="lt1"/>
+          </a:fillRef>
+          <a:effectRef idx="0">
+            <a:schemeClr val="accent6"/>
+          </a:effectRef>
+          <a:fontRef idx="minor">
+            <a:schemeClr val="dk1"/>
+          </a:fontRef>
+        </p:style>
+      </p:cxnSp>
+      <p:sp>
+        <p:nvSpPr>
+          <p:cNvPr id="76" name="Isosceles Triangle 75"/>
+          <p:cNvSpPr/>
+          <p:nvPr/>
+        </p:nvSpPr>
+        <p:spPr>
+          <a:xfrm>
+            <a:off x="357981" y="1627187"/>
+            <a:ext cx="381000" cy="304800"/>
+          </a:xfrm>
+          <a:prstGeom prst="triangle">
+            <a:avLst/>
+          </a:prstGeom>
+          <a:ln>
+            <a:solidFill>
+              <a:schemeClr val="bg1">
+                <a:lumMod val="50000"/>
+              </a:schemeClr>
+            </a:solidFill>
+          </a:ln>
+        </p:spPr>
+        <p:style>
+          <a:lnRef idx="2">
+            <a:schemeClr val="accent6"/>
+          </a:lnRef>
+          <a:fillRef idx="1">
+            <a:schemeClr val="lt1"/>
+          </a:fillRef>
+          <a:effectRef idx="0">
+            <a:schemeClr val="accent6"/>
+          </a:effectRef>
+          <a:fontRef idx="minor">
+            <a:schemeClr val="dk1"/>
+          </a:fontRef>
+        </p:style>
+        <p:txBody>
+          <a:bodyPr rtlCol="0" anchor="ctr"/>
+          <a:lstStyle/>
+          <a:p>
+            <a:pPr algn="ctr"/>
+            <a:endParaRPr lang="en-US"/>
+          </a:p>
+        </p:txBody>
+      </p:sp>
+      <p:cxnSp>
+        <p:nvCxnSpPr>
+          <p:cNvPr id="77" name="Shape 160"/>
+          <p:cNvCxnSpPr>
+            <a:stCxn id="76" idx="3"/>
+          </p:cNvCxnSpPr>
+          <p:nvPr/>
+        </p:nvCxnSpPr>
+        <p:spPr>
+          <a:xfrm rot="16200000" flipH="1">
+            <a:off x="925503" y="1554965"/>
+            <a:ext cx="381000" cy="1135044"/>
+          </a:xfrm>
+          <a:prstGeom prst="bentConnector2">
+            <a:avLst/>
+          </a:prstGeom>
+          <a:ln>
+            <a:solidFill>
+              <a:schemeClr val="bg1">
+                <a:lumMod val="50000"/>
+              </a:schemeClr>
+            </a:solidFill>
+          </a:ln>
+        </p:spPr>
+        <p:style>
+          <a:lnRef idx="2">
+            <a:schemeClr val="accent6"/>
+          </a:lnRef>
+          <a:fillRef idx="1">
+            <a:schemeClr val="lt1"/>
+          </a:fillRef>
+          <a:effectRef idx="0">
+            <a:schemeClr val="accent6"/>
+          </a:effectRef>
+          <a:fontRef idx="minor">
+            <a:schemeClr val="dk1"/>
+          </a:fontRef>
+        </p:style>
+      </p:cxnSp>
+      <p:sp>
+        <p:nvSpPr>
+          <p:cNvPr id="78" name="Isosceles Triangle 77"/>
+          <p:cNvSpPr/>
+          <p:nvPr/>
+        </p:nvSpPr>
+        <p:spPr>
+          <a:xfrm>
+            <a:off x="2796381" y="1627187"/>
+            <a:ext cx="381000" cy="304800"/>
+          </a:xfrm>
+          <a:prstGeom prst="triangle">
+            <a:avLst/>
+          </a:prstGeom>
+          <a:solidFill>
+            <a:schemeClr val="bg1"/>
+          </a:solidFill>
+          <a:ln>
+            <a:solidFill>
+              <a:srgbClr val="0070C0"/>
+            </a:solidFill>
+          </a:ln>
+        </p:spPr>
+        <p:style>
+          <a:lnRef idx="2">
+            <a:schemeClr val="accent6"/>
+          </a:lnRef>
+          <a:fillRef idx="1">
+            <a:schemeClr val="lt1"/>
+          </a:fillRef>
+          <a:effectRef idx="0">
+            <a:schemeClr val="accent6"/>
+          </a:effectRef>
+          <a:fontRef idx="minor">
+            <a:schemeClr val="dk1"/>
+          </a:fontRef>
+        </p:style>
+        <p:txBody>
+          <a:bodyPr rtlCol="0" anchor="ctr"/>
+          <a:lstStyle/>
+          <a:p>
+            <a:pPr algn="ctr"/>
+            <a:endParaRPr lang="en-US"/>
+          </a:p>
+        </p:txBody>
+      </p:sp>
+      <p:grpSp>
+        <p:nvGrpSpPr>
+          <p:cNvPr id="79" name="Group 78"/>
+          <p:cNvGrpSpPr/>
+          <p:nvPr/>
+        </p:nvGrpSpPr>
+        <p:grpSpPr>
+          <a:xfrm>
+            <a:off x="2732321" y="103187"/>
+            <a:ext cx="533400" cy="1066800"/>
+            <a:chOff x="1424781" y="1127919"/>
+            <a:chExt cx="609600" cy="1295400"/>
+          </a:xfrm>
+        </p:grpSpPr>
+        <p:sp>
+          <p:nvSpPr>
+            <p:cNvPr id="80" name="Flowchart: Connector 79"/>
             <p:cNvSpPr/>
             <p:nvPr/>
           </p:nvSpPr>
@@ -4096,9 +4544,9 @@
         </p:sp>
         <p:cxnSp>
           <p:nvCxnSpPr>
-            <p:cNvPr id="243" name="Straight Connector 242"/>
+            <p:cNvPr id="81" name="Straight Connector 80"/>
             <p:cNvCxnSpPr>
-              <a:stCxn id="242" idx="4"/>
+              <a:stCxn id="80" idx="4"/>
             </p:cNvCxnSpPr>
             <p:nvPr/>
           </p:nvCxnSpPr>
@@ -4133,7 +4581,7 @@
         </p:cxnSp>
         <p:cxnSp>
           <p:nvCxnSpPr>
-            <p:cNvPr id="244" name="Straight Connector 243"/>
+            <p:cNvPr id="82" name="Straight Connector 81"/>
             <p:cNvCxnSpPr/>
             <p:nvPr/>
           </p:nvCxnSpPr>
@@ -4168,7 +4616,7 @@
         </p:cxnSp>
         <p:cxnSp>
           <p:nvCxnSpPr>
-            <p:cNvPr id="245" name="Straight Connector 244"/>
+            <p:cNvPr id="83" name="Straight Connector 82"/>
             <p:cNvCxnSpPr/>
             <p:nvPr/>
           </p:nvCxnSpPr>
@@ -4203,774 +4651,7 @@
         </p:cxnSp>
         <p:cxnSp>
           <p:nvCxnSpPr>
-            <p:cNvPr id="246" name="Straight Connector 245"/>
-            <p:cNvCxnSpPr/>
-            <p:nvPr/>
-          </p:nvCxnSpPr>
-          <p:spPr>
-            <a:xfrm>
-              <a:off x="1424781" y="1737519"/>
-              <a:ext cx="609600" cy="0"/>
-            </a:xfrm>
-            <a:prstGeom prst="line">
-              <a:avLst/>
-            </a:prstGeom>
-            <a:ln>
-              <a:solidFill>
-                <a:srgbClr val="0070C0"/>
-              </a:solidFill>
-            </a:ln>
-          </p:spPr>
-          <p:style>
-            <a:lnRef idx="2">
-              <a:schemeClr val="accent1"/>
-            </a:lnRef>
-            <a:fillRef idx="1">
-              <a:schemeClr val="lt1"/>
-            </a:fillRef>
-            <a:effectRef idx="0">
-              <a:schemeClr val="accent1"/>
-            </a:effectRef>
-            <a:fontRef idx="minor">
-              <a:schemeClr val="dk1"/>
-            </a:fontRef>
-          </p:style>
-        </p:cxnSp>
-      </p:grpSp>
-      <p:sp>
-        <p:nvSpPr>
-          <p:cNvPr id="247" name="TextBox 246"/>
-          <p:cNvSpPr txBox="1"/>
-          <p:nvPr/>
-        </p:nvSpPr>
-        <p:spPr>
-          <a:xfrm>
-            <a:off x="2057400" y="3794919"/>
-            <a:ext cx="1699419" cy="615553"/>
-          </a:xfrm>
-          <a:prstGeom prst="rect">
-            <a:avLst/>
-          </a:prstGeom>
-          <a:noFill/>
-        </p:spPr>
-        <p:txBody>
-          <a:bodyPr wrap="square" rtlCol="0">
-            <a:spAutoFit/>
-          </a:bodyPr>
-          <a:lstStyle/>
-          <a:p>
-            <a:pPr algn="ctr"/>
-            <a:r>
-              <a:rPr lang="en-US" b="1" dirty="0" smtClean="0">
-                <a:solidFill>
-                  <a:srgbClr val="0070C0"/>
-                </a:solidFill>
-              </a:rPr>
-              <a:t>Instructor (module owner)</a:t>
-            </a:r>
-            <a:endParaRPr lang="en-US" b="1" dirty="0">
-              <a:solidFill>
-                <a:srgbClr val="0070C0"/>
-              </a:solidFill>
-            </a:endParaRPr>
-          </a:p>
-        </p:txBody>
-      </p:sp>
-      <p:grpSp>
-        <p:nvGrpSpPr>
-          <p:cNvPr id="248" name="Group 247"/>
-          <p:cNvGrpSpPr/>
-          <p:nvPr/>
-        </p:nvGrpSpPr>
-        <p:grpSpPr>
-          <a:xfrm>
-            <a:off x="1424781" y="4099719"/>
-            <a:ext cx="533400" cy="1066800"/>
-            <a:chOff x="1424781" y="1127919"/>
-            <a:chExt cx="609600" cy="1295400"/>
-          </a:xfrm>
-        </p:grpSpPr>
-        <p:sp>
-          <p:nvSpPr>
-            <p:cNvPr id="249" name="Flowchart: Connector 248"/>
-            <p:cNvSpPr/>
-            <p:nvPr/>
-          </p:nvSpPr>
-          <p:spPr>
-            <a:xfrm>
-              <a:off x="1500981" y="1127919"/>
-              <a:ext cx="457200" cy="457200"/>
-            </a:xfrm>
-            <a:prstGeom prst="flowChartConnector">
-              <a:avLst/>
-            </a:prstGeom>
-          </p:spPr>
-          <p:style>
-            <a:lnRef idx="2">
-              <a:schemeClr val="accent2"/>
-            </a:lnRef>
-            <a:fillRef idx="1">
-              <a:schemeClr val="lt1"/>
-            </a:fillRef>
-            <a:effectRef idx="0">
-              <a:schemeClr val="accent2"/>
-            </a:effectRef>
-            <a:fontRef idx="minor">
-              <a:schemeClr val="dk1"/>
-            </a:fontRef>
-          </p:style>
-          <p:txBody>
-            <a:bodyPr rtlCol="0" anchor="ctr"/>
-            <a:lstStyle/>
-            <a:p>
-              <a:pPr algn="ctr"/>
-              <a:endParaRPr lang="en-US"/>
-            </a:p>
-          </p:txBody>
-        </p:sp>
-        <p:cxnSp>
-          <p:nvCxnSpPr>
-            <p:cNvPr id="250" name="Straight Connector 249"/>
-            <p:cNvCxnSpPr>
-              <a:stCxn id="249" idx="4"/>
-            </p:cNvCxnSpPr>
-            <p:nvPr/>
-          </p:nvCxnSpPr>
-          <p:spPr>
-            <a:xfrm>
-              <a:off x="1729581" y="1585119"/>
-              <a:ext cx="0" cy="457200"/>
-            </a:xfrm>
-            <a:prstGeom prst="line">
-              <a:avLst/>
-            </a:prstGeom>
-          </p:spPr>
-          <p:style>
-            <a:lnRef idx="2">
-              <a:schemeClr val="accent2"/>
-            </a:lnRef>
-            <a:fillRef idx="1">
-              <a:schemeClr val="lt1"/>
-            </a:fillRef>
-            <a:effectRef idx="0">
-              <a:schemeClr val="accent2"/>
-            </a:effectRef>
-            <a:fontRef idx="minor">
-              <a:schemeClr val="dk1"/>
-            </a:fontRef>
-          </p:style>
-        </p:cxnSp>
-        <p:cxnSp>
-          <p:nvCxnSpPr>
-            <p:cNvPr id="251" name="Straight Connector 250"/>
-            <p:cNvCxnSpPr/>
-            <p:nvPr/>
-          </p:nvCxnSpPr>
-          <p:spPr>
-            <a:xfrm flipH="1">
-              <a:off x="1500981" y="2042319"/>
-              <a:ext cx="228600" cy="381000"/>
-            </a:xfrm>
-            <a:prstGeom prst="line">
-              <a:avLst/>
-            </a:prstGeom>
-          </p:spPr>
-          <p:style>
-            <a:lnRef idx="2">
-              <a:schemeClr val="accent2"/>
-            </a:lnRef>
-            <a:fillRef idx="1">
-              <a:schemeClr val="lt1"/>
-            </a:fillRef>
-            <a:effectRef idx="0">
-              <a:schemeClr val="accent2"/>
-            </a:effectRef>
-            <a:fontRef idx="minor">
-              <a:schemeClr val="dk1"/>
-            </a:fontRef>
-          </p:style>
-        </p:cxnSp>
-        <p:cxnSp>
-          <p:nvCxnSpPr>
-            <p:cNvPr id="252" name="Straight Connector 251"/>
-            <p:cNvCxnSpPr/>
-            <p:nvPr/>
-          </p:nvCxnSpPr>
-          <p:spPr>
-            <a:xfrm>
-              <a:off x="1729581" y="2042319"/>
-              <a:ext cx="228600" cy="381000"/>
-            </a:xfrm>
-            <a:prstGeom prst="line">
-              <a:avLst/>
-            </a:prstGeom>
-          </p:spPr>
-          <p:style>
-            <a:lnRef idx="2">
-              <a:schemeClr val="accent2"/>
-            </a:lnRef>
-            <a:fillRef idx="1">
-              <a:schemeClr val="lt1"/>
-            </a:fillRef>
-            <a:effectRef idx="0">
-              <a:schemeClr val="accent2"/>
-            </a:effectRef>
-            <a:fontRef idx="minor">
-              <a:schemeClr val="dk1"/>
-            </a:fontRef>
-          </p:style>
-        </p:cxnSp>
-        <p:cxnSp>
-          <p:nvCxnSpPr>
-            <p:cNvPr id="253" name="Straight Connector 252"/>
-            <p:cNvCxnSpPr/>
-            <p:nvPr/>
-          </p:nvCxnSpPr>
-          <p:spPr>
-            <a:xfrm>
-              <a:off x="1424781" y="1737519"/>
-              <a:ext cx="609600" cy="0"/>
-            </a:xfrm>
-            <a:prstGeom prst="line">
-              <a:avLst/>
-            </a:prstGeom>
-          </p:spPr>
-          <p:style>
-            <a:lnRef idx="2">
-              <a:schemeClr val="accent2"/>
-            </a:lnRef>
-            <a:fillRef idx="1">
-              <a:schemeClr val="lt1"/>
-            </a:fillRef>
-            <a:effectRef idx="0">
-              <a:schemeClr val="accent2"/>
-            </a:effectRef>
-            <a:fontRef idx="minor">
-              <a:schemeClr val="dk1"/>
-            </a:fontRef>
-          </p:style>
-        </p:cxnSp>
-      </p:grpSp>
-      <p:sp>
-        <p:nvSpPr>
-          <p:cNvPr id="254" name="TextBox 253"/>
-          <p:cNvSpPr txBox="1"/>
-          <p:nvPr/>
-        </p:nvSpPr>
-        <p:spPr>
-          <a:xfrm>
-            <a:off x="1272381" y="5166519"/>
-            <a:ext cx="838200" cy="353943"/>
-          </a:xfrm>
-          <a:prstGeom prst="rect">
-            <a:avLst/>
-          </a:prstGeom>
-          <a:noFill/>
-        </p:spPr>
-        <p:txBody>
-          <a:bodyPr wrap="square" rtlCol="0">
-            <a:spAutoFit/>
-          </a:bodyPr>
-          <a:lstStyle/>
-          <a:p>
-            <a:r>
-              <a:rPr lang="en-US" b="1" dirty="0" smtClean="0">
-                <a:solidFill>
-                  <a:srgbClr val="C00000"/>
-                </a:solidFill>
-              </a:rPr>
-              <a:t>Admin</a:t>
-            </a:r>
-            <a:endParaRPr lang="en-US" b="1" dirty="0">
-              <a:solidFill>
-                <a:srgbClr val="C00000"/>
-              </a:solidFill>
-            </a:endParaRPr>
-          </a:p>
-        </p:txBody>
-      </p:sp>
-      <p:sp>
-        <p:nvSpPr>
-          <p:cNvPr id="255" name="Isosceles Triangle 254"/>
-          <p:cNvSpPr/>
-          <p:nvPr/>
-        </p:nvSpPr>
-        <p:spPr>
-          <a:xfrm>
-            <a:off x="1500981" y="1966119"/>
-            <a:ext cx="381000" cy="304800"/>
-          </a:xfrm>
-          <a:prstGeom prst="triangle">
-            <a:avLst/>
-          </a:prstGeom>
-        </p:spPr>
-        <p:style>
-          <a:lnRef idx="2">
-            <a:schemeClr val="accent6"/>
-          </a:lnRef>
-          <a:fillRef idx="1">
-            <a:schemeClr val="lt1"/>
-          </a:fillRef>
-          <a:effectRef idx="0">
-            <a:schemeClr val="accent6"/>
-          </a:effectRef>
-          <a:fontRef idx="minor">
-            <a:schemeClr val="dk1"/>
-          </a:fontRef>
-        </p:style>
-        <p:txBody>
-          <a:bodyPr rtlCol="0" anchor="ctr"/>
-          <a:lstStyle/>
-          <a:p>
-            <a:pPr algn="ctr"/>
-            <a:endParaRPr lang="en-US"/>
-          </a:p>
-        </p:txBody>
-      </p:sp>
-      <p:sp>
-        <p:nvSpPr>
-          <p:cNvPr id="256" name="Isosceles Triangle 255"/>
-          <p:cNvSpPr/>
-          <p:nvPr/>
-        </p:nvSpPr>
-        <p:spPr>
-          <a:xfrm>
-            <a:off x="2796381" y="4404519"/>
-            <a:ext cx="381000" cy="304800"/>
-          </a:xfrm>
-          <a:prstGeom prst="triangle">
-            <a:avLst/>
-          </a:prstGeom>
-          <a:ln>
-            <a:solidFill>
-              <a:srgbClr val="0070C0"/>
-            </a:solidFill>
-          </a:ln>
-        </p:spPr>
-        <p:style>
-          <a:lnRef idx="2">
-            <a:schemeClr val="accent6"/>
-          </a:lnRef>
-          <a:fillRef idx="1">
-            <a:schemeClr val="lt1"/>
-          </a:fillRef>
-          <a:effectRef idx="0">
-            <a:schemeClr val="accent6"/>
-          </a:effectRef>
-          <a:fontRef idx="minor">
-            <a:schemeClr val="dk1"/>
-          </a:fontRef>
-        </p:style>
-        <p:txBody>
-          <a:bodyPr rtlCol="0" anchor="ctr"/>
-          <a:lstStyle/>
-          <a:p>
-            <a:pPr algn="ctr"/>
-            <a:endParaRPr lang="en-US"/>
-          </a:p>
-        </p:txBody>
-      </p:sp>
-      <p:cxnSp>
-        <p:nvCxnSpPr>
-          <p:cNvPr id="257" name="Straight Connector 256"/>
-          <p:cNvCxnSpPr/>
-          <p:nvPr/>
-        </p:nvCxnSpPr>
-        <p:spPr>
-          <a:xfrm>
-            <a:off x="1683525" y="2270919"/>
-            <a:ext cx="0" cy="1676400"/>
-          </a:xfrm>
-          <a:prstGeom prst="line">
-            <a:avLst/>
-          </a:prstGeom>
-        </p:spPr>
-        <p:style>
-          <a:lnRef idx="2">
-            <a:schemeClr val="accent6"/>
-          </a:lnRef>
-          <a:fillRef idx="1">
-            <a:schemeClr val="lt1"/>
-          </a:fillRef>
-          <a:effectRef idx="0">
-            <a:schemeClr val="accent6"/>
-          </a:effectRef>
-          <a:fontRef idx="minor">
-            <a:schemeClr val="dk1"/>
-          </a:fontRef>
-        </p:style>
-      </p:cxnSp>
-      <p:cxnSp>
-        <p:nvCxnSpPr>
-          <p:cNvPr id="258" name="Shape 257"/>
-          <p:cNvCxnSpPr>
-            <a:stCxn id="256" idx="3"/>
-          </p:cNvCxnSpPr>
-          <p:nvPr/>
-        </p:nvCxnSpPr>
-        <p:spPr>
-          <a:xfrm rot="5400000">
-            <a:off x="2358231" y="4309269"/>
-            <a:ext cx="228600" cy="1028700"/>
-          </a:xfrm>
-          <a:prstGeom prst="bentConnector2">
-            <a:avLst/>
-          </a:prstGeom>
-          <a:ln>
-            <a:solidFill>
-              <a:srgbClr val="0070C0"/>
-            </a:solidFill>
-          </a:ln>
-        </p:spPr>
-        <p:style>
-          <a:lnRef idx="2">
-            <a:schemeClr val="accent6"/>
-          </a:lnRef>
-          <a:fillRef idx="1">
-            <a:schemeClr val="lt1"/>
-          </a:fillRef>
-          <a:effectRef idx="0">
-            <a:schemeClr val="accent6"/>
-          </a:effectRef>
-          <a:fontRef idx="minor">
-            <a:schemeClr val="dk1"/>
-          </a:fontRef>
-        </p:style>
-      </p:cxnSp>
-      <p:sp>
-        <p:nvSpPr>
-          <p:cNvPr id="259" name="Isosceles Triangle 258"/>
-          <p:cNvSpPr/>
-          <p:nvPr/>
-        </p:nvSpPr>
-        <p:spPr>
-          <a:xfrm>
-            <a:off x="357981" y="1966119"/>
-            <a:ext cx="381000" cy="304800"/>
-          </a:xfrm>
-          <a:prstGeom prst="triangle">
-            <a:avLst/>
-          </a:prstGeom>
-          <a:ln>
-            <a:solidFill>
-              <a:schemeClr val="bg1">
-                <a:lumMod val="50000"/>
-              </a:schemeClr>
-            </a:solidFill>
-          </a:ln>
-        </p:spPr>
-        <p:style>
-          <a:lnRef idx="2">
-            <a:schemeClr val="accent6"/>
-          </a:lnRef>
-          <a:fillRef idx="1">
-            <a:schemeClr val="lt1"/>
-          </a:fillRef>
-          <a:effectRef idx="0">
-            <a:schemeClr val="accent6"/>
-          </a:effectRef>
-          <a:fontRef idx="minor">
-            <a:schemeClr val="dk1"/>
-          </a:fontRef>
-        </p:style>
-        <p:txBody>
-          <a:bodyPr rtlCol="0" anchor="ctr"/>
-          <a:lstStyle/>
-          <a:p>
-            <a:pPr algn="ctr"/>
-            <a:endParaRPr lang="en-US"/>
-          </a:p>
-        </p:txBody>
-      </p:sp>
-      <p:cxnSp>
-        <p:nvCxnSpPr>
-          <p:cNvPr id="260" name="Shape 160"/>
-          <p:cNvCxnSpPr>
-            <a:stCxn id="259" idx="3"/>
-          </p:cNvCxnSpPr>
-          <p:nvPr/>
-        </p:nvCxnSpPr>
-        <p:spPr>
-          <a:xfrm rot="16200000" flipH="1">
-            <a:off x="-423069" y="3242469"/>
-            <a:ext cx="2667000" cy="723900"/>
-          </a:xfrm>
-          <a:prstGeom prst="bentConnector3">
-            <a:avLst>
-              <a:gd name="adj1" fmla="val 99356"/>
-            </a:avLst>
-          </a:prstGeom>
-          <a:ln>
-            <a:solidFill>
-              <a:schemeClr val="bg1">
-                <a:lumMod val="50000"/>
-              </a:schemeClr>
-            </a:solidFill>
-          </a:ln>
-        </p:spPr>
-        <p:style>
-          <a:lnRef idx="2">
-            <a:schemeClr val="accent6"/>
-          </a:lnRef>
-          <a:fillRef idx="1">
-            <a:schemeClr val="lt1"/>
-          </a:fillRef>
-          <a:effectRef idx="0">
-            <a:schemeClr val="accent6"/>
-          </a:effectRef>
-          <a:fontRef idx="minor">
-            <a:schemeClr val="dk1"/>
-          </a:fontRef>
-        </p:style>
-      </p:cxnSp>
-      <p:cxnSp>
-        <p:nvCxnSpPr>
-          <p:cNvPr id="261" name="Straight Connector 260"/>
-          <p:cNvCxnSpPr/>
-          <p:nvPr/>
-        </p:nvCxnSpPr>
-        <p:spPr>
-          <a:xfrm>
-            <a:off x="2971800" y="2194719"/>
-            <a:ext cx="0" cy="533400"/>
-          </a:xfrm>
-          <a:prstGeom prst="line">
-            <a:avLst/>
-          </a:prstGeom>
-          <a:ln>
-            <a:solidFill>
-              <a:srgbClr val="0070C0"/>
-            </a:solidFill>
-          </a:ln>
-        </p:spPr>
-        <p:style>
-          <a:lnRef idx="2">
-            <a:schemeClr val="accent6"/>
-          </a:lnRef>
-          <a:fillRef idx="1">
-            <a:schemeClr val="lt1"/>
-          </a:fillRef>
-          <a:effectRef idx="0">
-            <a:schemeClr val="accent6"/>
-          </a:effectRef>
-          <a:fontRef idx="minor">
-            <a:schemeClr val="dk1"/>
-          </a:fontRef>
-        </p:style>
-      </p:cxnSp>
-      <p:sp>
-        <p:nvSpPr>
-          <p:cNvPr id="262" name="Isosceles Triangle 261"/>
-          <p:cNvSpPr/>
-          <p:nvPr/>
-        </p:nvSpPr>
-        <p:spPr>
-          <a:xfrm>
-            <a:off x="2796381" y="1966119"/>
-            <a:ext cx="381000" cy="304800"/>
-          </a:xfrm>
-          <a:prstGeom prst="triangle">
-            <a:avLst/>
-          </a:prstGeom>
-          <a:solidFill>
-            <a:schemeClr val="bg1"/>
-          </a:solidFill>
-          <a:ln>
-            <a:solidFill>
-              <a:srgbClr val="0070C0"/>
-            </a:solidFill>
-          </a:ln>
-        </p:spPr>
-        <p:style>
-          <a:lnRef idx="2">
-            <a:schemeClr val="accent6"/>
-          </a:lnRef>
-          <a:fillRef idx="1">
-            <a:schemeClr val="lt1"/>
-          </a:fillRef>
-          <a:effectRef idx="0">
-            <a:schemeClr val="accent6"/>
-          </a:effectRef>
-          <a:fontRef idx="minor">
-            <a:schemeClr val="dk1"/>
-          </a:fontRef>
-        </p:style>
-        <p:txBody>
-          <a:bodyPr rtlCol="0" anchor="ctr"/>
-          <a:lstStyle/>
-          <a:p>
-            <a:pPr algn="ctr"/>
-            <a:endParaRPr lang="en-US"/>
-          </a:p>
-        </p:txBody>
-      </p:sp>
-      <p:grpSp>
-        <p:nvGrpSpPr>
-          <p:cNvPr id="45" name="Group 44"/>
-          <p:cNvGrpSpPr/>
-          <p:nvPr/>
-        </p:nvGrpSpPr>
-        <p:grpSpPr>
-          <a:xfrm>
-            <a:off x="2732321" y="442119"/>
-            <a:ext cx="533400" cy="1066800"/>
-            <a:chOff x="1424781" y="1127919"/>
-            <a:chExt cx="609600" cy="1295400"/>
-          </a:xfrm>
-        </p:grpSpPr>
-        <p:sp>
-          <p:nvSpPr>
-            <p:cNvPr id="46" name="Flowchart: Connector 45"/>
-            <p:cNvSpPr/>
-            <p:nvPr/>
-          </p:nvSpPr>
-          <p:spPr>
-            <a:xfrm>
-              <a:off x="1500981" y="1127919"/>
-              <a:ext cx="457200" cy="457200"/>
-            </a:xfrm>
-            <a:prstGeom prst="flowChartConnector">
-              <a:avLst/>
-            </a:prstGeom>
-            <a:ln>
-              <a:solidFill>
-                <a:srgbClr val="0070C0"/>
-              </a:solidFill>
-            </a:ln>
-          </p:spPr>
-          <p:style>
-            <a:lnRef idx="2">
-              <a:schemeClr val="accent1"/>
-            </a:lnRef>
-            <a:fillRef idx="1">
-              <a:schemeClr val="lt1"/>
-            </a:fillRef>
-            <a:effectRef idx="0">
-              <a:schemeClr val="accent1"/>
-            </a:effectRef>
-            <a:fontRef idx="minor">
-              <a:schemeClr val="dk1"/>
-            </a:fontRef>
-          </p:style>
-          <p:txBody>
-            <a:bodyPr rtlCol="0" anchor="ctr"/>
-            <a:lstStyle/>
-            <a:p>
-              <a:pPr algn="ctr"/>
-              <a:endParaRPr lang="en-US"/>
-            </a:p>
-          </p:txBody>
-        </p:sp>
-        <p:cxnSp>
-          <p:nvCxnSpPr>
-            <p:cNvPr id="47" name="Straight Connector 46"/>
-            <p:cNvCxnSpPr>
-              <a:stCxn id="46" idx="4"/>
-            </p:cNvCxnSpPr>
-            <p:nvPr/>
-          </p:nvCxnSpPr>
-          <p:spPr>
-            <a:xfrm>
-              <a:off x="1729581" y="1585119"/>
-              <a:ext cx="0" cy="457200"/>
-            </a:xfrm>
-            <a:prstGeom prst="line">
-              <a:avLst/>
-            </a:prstGeom>
-            <a:ln>
-              <a:solidFill>
-                <a:srgbClr val="0070C0"/>
-              </a:solidFill>
-            </a:ln>
-          </p:spPr>
-          <p:style>
-            <a:lnRef idx="2">
-              <a:schemeClr val="accent1"/>
-            </a:lnRef>
-            <a:fillRef idx="1">
-              <a:schemeClr val="lt1"/>
-            </a:fillRef>
-            <a:effectRef idx="0">
-              <a:schemeClr val="accent1"/>
-            </a:effectRef>
-            <a:fontRef idx="minor">
-              <a:schemeClr val="dk1"/>
-            </a:fontRef>
-          </p:style>
-        </p:cxnSp>
-        <p:cxnSp>
-          <p:nvCxnSpPr>
-            <p:cNvPr id="48" name="Straight Connector 47"/>
-            <p:cNvCxnSpPr/>
-            <p:nvPr/>
-          </p:nvCxnSpPr>
-          <p:spPr>
-            <a:xfrm flipH="1">
-              <a:off x="1500981" y="2042319"/>
-              <a:ext cx="228600" cy="381000"/>
-            </a:xfrm>
-            <a:prstGeom prst="line">
-              <a:avLst/>
-            </a:prstGeom>
-            <a:ln>
-              <a:solidFill>
-                <a:srgbClr val="0070C0"/>
-              </a:solidFill>
-            </a:ln>
-          </p:spPr>
-          <p:style>
-            <a:lnRef idx="2">
-              <a:schemeClr val="accent1"/>
-            </a:lnRef>
-            <a:fillRef idx="1">
-              <a:schemeClr val="lt1"/>
-            </a:fillRef>
-            <a:effectRef idx="0">
-              <a:schemeClr val="accent1"/>
-            </a:effectRef>
-            <a:fontRef idx="minor">
-              <a:schemeClr val="dk1"/>
-            </a:fontRef>
-          </p:style>
-        </p:cxnSp>
-        <p:cxnSp>
-          <p:nvCxnSpPr>
-            <p:cNvPr id="49" name="Straight Connector 48"/>
-            <p:cNvCxnSpPr/>
-            <p:nvPr/>
-          </p:nvCxnSpPr>
-          <p:spPr>
-            <a:xfrm>
-              <a:off x="1729581" y="2042319"/>
-              <a:ext cx="228600" cy="381000"/>
-            </a:xfrm>
-            <a:prstGeom prst="line">
-              <a:avLst/>
-            </a:prstGeom>
-            <a:ln>
-              <a:solidFill>
-                <a:srgbClr val="0070C0"/>
-              </a:solidFill>
-            </a:ln>
-          </p:spPr>
-          <p:style>
-            <a:lnRef idx="2">
-              <a:schemeClr val="accent1"/>
-            </a:lnRef>
-            <a:fillRef idx="1">
-              <a:schemeClr val="lt1"/>
-            </a:fillRef>
-            <a:effectRef idx="0">
-              <a:schemeClr val="accent1"/>
-            </a:effectRef>
-            <a:fontRef idx="minor">
-              <a:schemeClr val="dk1"/>
-            </a:fontRef>
-          </p:style>
-        </p:cxnSp>
-        <p:cxnSp>
-          <p:nvCxnSpPr>
-            <p:cNvPr id="50" name="Straight Connector 49"/>
+            <p:cNvPr id="84" name="Straight Connector 83"/>
             <p:cNvCxnSpPr/>
             <p:nvPr/>
           </p:nvCxnSpPr>

</xml_diff>